<commit_message>
Updates from Brian and Ontario
</commit_message>
<xml_diff>
--- a/presentations/sdc/4-SDC-Rendering-Behavior.pptx
+++ b/presentations/sdc/4-SDC-Rendering-Behavior.pptx
@@ -2,30 +2,30 @@
 <file path=ppt/presentation.xml><?xml version="1.0" encoding="utf-8"?>
 <p:presentation xmlns:a="http://schemas.openxmlformats.org/drawingml/2006/main" xmlns:r="http://schemas.openxmlformats.org/officeDocument/2006/relationships" xmlns:p="http://schemas.openxmlformats.org/presentationml/2006/main" saveSubsetFonts="1" autoCompressPictures="0">
   <p:sldMasterIdLst>
-    <p:sldMasterId id="2147483648" r:id="rId1"/>
+    <p:sldMasterId id="2147483648" r:id="rId4"/>
   </p:sldMasterIdLst>
   <p:notesMasterIdLst>
-    <p:notesMasterId r:id="rId17"/>
+    <p:notesMasterId r:id="rId20"/>
   </p:notesMasterIdLst>
   <p:handoutMasterIdLst>
-    <p:handoutMasterId r:id="rId18"/>
+    <p:handoutMasterId r:id="rId21"/>
   </p:handoutMasterIdLst>
   <p:sldIdLst>
-    <p:sldId id="672" r:id="rId2"/>
-    <p:sldId id="690" r:id="rId3"/>
-    <p:sldId id="665" r:id="rId4"/>
-    <p:sldId id="680" r:id="rId5"/>
-    <p:sldId id="758" r:id="rId6"/>
-    <p:sldId id="313" r:id="rId7"/>
-    <p:sldId id="4811" r:id="rId8"/>
-    <p:sldId id="4810" r:id="rId9"/>
-    <p:sldId id="4813" r:id="rId10"/>
-    <p:sldId id="4812" r:id="rId11"/>
-    <p:sldId id="4802" r:id="rId12"/>
-    <p:sldId id="4815" r:id="rId13"/>
-    <p:sldId id="4814" r:id="rId14"/>
-    <p:sldId id="4816" r:id="rId15"/>
-    <p:sldId id="759" r:id="rId16"/>
+    <p:sldId id="797" r:id="rId5"/>
+    <p:sldId id="690" r:id="rId6"/>
+    <p:sldId id="665" r:id="rId7"/>
+    <p:sldId id="680" r:id="rId8"/>
+    <p:sldId id="758" r:id="rId9"/>
+    <p:sldId id="313" r:id="rId10"/>
+    <p:sldId id="4811" r:id="rId11"/>
+    <p:sldId id="4810" r:id="rId12"/>
+    <p:sldId id="4813" r:id="rId13"/>
+    <p:sldId id="4812" r:id="rId14"/>
+    <p:sldId id="4802" r:id="rId15"/>
+    <p:sldId id="4815" r:id="rId16"/>
+    <p:sldId id="4814" r:id="rId17"/>
+    <p:sldId id="4816" r:id="rId18"/>
+    <p:sldId id="759" r:id="rId19"/>
   </p:sldIdLst>
   <p:sldSz cx="9144000" cy="5143500" type="screen16x9"/>
   <p:notesSz cx="6858000" cy="9144000"/>
@@ -159,7 +159,7 @@
       <p14:sectionLst xmlns:p14="http://schemas.microsoft.com/office/powerpoint/2010/main">
         <p14:section name="Default Section" id="{A3B7BF1A-48CE-4925-8F93-96FAB591DFC7}">
           <p14:sldIdLst>
-            <p14:sldId id="672"/>
+            <p14:sldId id="797"/>
           </p14:sldIdLst>
         </p14:section>
         <p14:section name="Expressions Introduction" id="{2A578097-FEE4-49B0-858C-B6A0014658D4}">
@@ -197,6 +197,471 @@
 </p:presentation>
 </file>
 
+<file path=ppt/authors.xml><?xml version="1.0" encoding="utf-8"?>
+<p188:authorLst xmlns:a="http://schemas.openxmlformats.org/drawingml/2006/main" xmlns:r="http://schemas.openxmlformats.org/officeDocument/2006/relationships" xmlns:p188="http://schemas.microsoft.com/office/powerpoint/2018/8/main">
+  <p188:author id="{E7F7EB04-2042-28C4-7D23-DF347712863D}" name="Forouzi, Sam" initials="SF" userId="S::sam.forouzi@ontariohealth.ca::0b6d262b-2292-43d2-8971-5e6d1ff46381" providerId="AD"/>
+</p188:authorLst>
+</file>
+
+<file path=ppt/revisionInfo.xml><?xml version="1.0" encoding="utf-8"?>
+<p1510:revInfo xmlns:a="http://schemas.openxmlformats.org/drawingml/2006/main" xmlns:r="http://schemas.openxmlformats.org/officeDocument/2006/relationships" xmlns:p1510="http://schemas.microsoft.com/office/powerpoint/2015/10/main">
+  <p1510:revLst>
+    <p1510:client id="{7A5B4E22-CA02-3813-FF3B-25AE24901535}" v="1" dt="2025-02-06T20:09:59.956"/>
+    <p1510:client id="{FC84101D-73EE-8C30-384A-8AB6C6315A8C}" v="26" dt="2025-02-07T18:23:44.057"/>
+  </p1510:revLst>
+</p1510:revInfo>
+</file>
+
+<file path=ppt/changesInfos/changesInfo1.xml><?xml version="1.0" encoding="utf-8"?>
+<pc:chgInfo xmlns:a="http://schemas.openxmlformats.org/drawingml/2006/main" xmlns:r="http://schemas.openxmlformats.org/officeDocument/2006/relationships" xmlns:ac="http://schemas.microsoft.com/office/drawing/2013/main/command" xmlns:pc="http://schemas.microsoft.com/office/powerpoint/2013/main/command">
+  <pc:docChgLst>
+    <pc:chgData name="McKenzie, Lloyd" userId="S::lloyd.mckenzie@ontariohealth.ca::4544ac19-90a7-4bc9-9dda-63119ceabc25" providerId="AD" clId="Web-{FC84101D-73EE-8C30-384A-8AB6C6315A8C}"/>
+    <pc:docChg chg="addSld delSld modSld modMainMaster modSection">
+      <pc:chgData name="McKenzie, Lloyd" userId="S::lloyd.mckenzie@ontariohealth.ca::4544ac19-90a7-4bc9-9dda-63119ceabc25" providerId="AD" clId="Web-{FC84101D-73EE-8C30-384A-8AB6C6315A8C}" dt="2025-02-07T18:23:44.057" v="20" actId="20577"/>
+      <pc:docMkLst>
+        <pc:docMk/>
+      </pc:docMkLst>
+      <pc:sldChg chg="modSp">
+        <pc:chgData name="McKenzie, Lloyd" userId="S::lloyd.mckenzie@ontariohealth.ca::4544ac19-90a7-4bc9-9dda-63119ceabc25" providerId="AD" clId="Web-{FC84101D-73EE-8C30-384A-8AB6C6315A8C}" dt="2025-02-07T16:53:04.597" v="12"/>
+        <pc:sldMkLst>
+          <pc:docMk/>
+          <pc:sldMk cId="655917162" sldId="665"/>
+        </pc:sldMkLst>
+        <pc:spChg chg="mod">
+          <ac:chgData name="McKenzie, Lloyd" userId="S::lloyd.mckenzie@ontariohealth.ca::4544ac19-90a7-4bc9-9dda-63119ceabc25" providerId="AD" clId="Web-{FC84101D-73EE-8C30-384A-8AB6C6315A8C}" dt="2025-02-07T16:53:04.597" v="12"/>
+          <ac:spMkLst>
+            <pc:docMk/>
+            <pc:sldMk cId="655917162" sldId="665"/>
+            <ac:spMk id="11" creationId="{E5D67FA5-D1E9-4E1E-B63E-097C12003FCF}"/>
+          </ac:spMkLst>
+        </pc:spChg>
+      </pc:sldChg>
+      <pc:sldChg chg="modSp del">
+        <pc:chgData name="McKenzie, Lloyd" userId="S::lloyd.mckenzie@ontariohealth.ca::4544ac19-90a7-4bc9-9dda-63119ceabc25" providerId="AD" clId="Web-{FC84101D-73EE-8C30-384A-8AB6C6315A8C}" dt="2025-02-07T18:21:28.711" v="17"/>
+        <pc:sldMkLst>
+          <pc:docMk/>
+          <pc:sldMk cId="1226924551" sldId="672"/>
+        </pc:sldMkLst>
+        <pc:spChg chg="mod">
+          <ac:chgData name="McKenzie, Lloyd" userId="S::lloyd.mckenzie@ontariohealth.ca::4544ac19-90a7-4bc9-9dda-63119ceabc25" providerId="AD" clId="Web-{FC84101D-73EE-8C30-384A-8AB6C6315A8C}" dt="2025-02-07T16:53:04.597" v="12"/>
+          <ac:spMkLst>
+            <pc:docMk/>
+            <pc:sldMk cId="1226924551" sldId="672"/>
+            <ac:spMk id="2" creationId="{2DB8BFEF-A591-4AA8-9418-E34A204D637F}"/>
+          </ac:spMkLst>
+        </pc:spChg>
+        <pc:spChg chg="mod">
+          <ac:chgData name="McKenzie, Lloyd" userId="S::lloyd.mckenzie@ontariohealth.ca::4544ac19-90a7-4bc9-9dda-63119ceabc25" providerId="AD" clId="Web-{FC84101D-73EE-8C30-384A-8AB6C6315A8C}" dt="2025-02-07T16:02:21.189" v="11" actId="20577"/>
+          <ac:spMkLst>
+            <pc:docMk/>
+            <pc:sldMk cId="1226924551" sldId="672"/>
+            <ac:spMk id="8" creationId="{62EAEE4D-DFDC-4EFC-B01D-4E1EAA084740}"/>
+          </ac:spMkLst>
+        </pc:spChg>
+      </pc:sldChg>
+      <pc:sldChg chg="modSp">
+        <pc:chgData name="McKenzie, Lloyd" userId="S::lloyd.mckenzie@ontariohealth.ca::4544ac19-90a7-4bc9-9dda-63119ceabc25" providerId="AD" clId="Web-{FC84101D-73EE-8C30-384A-8AB6C6315A8C}" dt="2025-02-07T16:53:04.597" v="12"/>
+        <pc:sldMkLst>
+          <pc:docMk/>
+          <pc:sldMk cId="1920275464" sldId="680"/>
+        </pc:sldMkLst>
+        <pc:spChg chg="mod">
+          <ac:chgData name="McKenzie, Lloyd" userId="S::lloyd.mckenzie@ontariohealth.ca::4544ac19-90a7-4bc9-9dda-63119ceabc25" providerId="AD" clId="Web-{FC84101D-73EE-8C30-384A-8AB6C6315A8C}" dt="2025-02-07T16:53:04.597" v="12"/>
+          <ac:spMkLst>
+            <pc:docMk/>
+            <pc:sldMk cId="1920275464" sldId="680"/>
+            <ac:spMk id="2" creationId="{12A36B17-60AD-40D9-B33D-C4B147E58C6F}"/>
+          </ac:spMkLst>
+        </pc:spChg>
+      </pc:sldChg>
+      <pc:sldChg chg="modSp">
+        <pc:chgData name="McKenzie, Lloyd" userId="S::lloyd.mckenzie@ontariohealth.ca::4544ac19-90a7-4bc9-9dda-63119ceabc25" providerId="AD" clId="Web-{FC84101D-73EE-8C30-384A-8AB6C6315A8C}" dt="2025-02-07T16:53:04.597" v="12"/>
+        <pc:sldMkLst>
+          <pc:docMk/>
+          <pc:sldMk cId="1547336493" sldId="690"/>
+        </pc:sldMkLst>
+        <pc:spChg chg="mod">
+          <ac:chgData name="McKenzie, Lloyd" userId="S::lloyd.mckenzie@ontariohealth.ca::4544ac19-90a7-4bc9-9dda-63119ceabc25" providerId="AD" clId="Web-{FC84101D-73EE-8C30-384A-8AB6C6315A8C}" dt="2025-02-07T16:53:04.597" v="12"/>
+          <ac:spMkLst>
+            <pc:docMk/>
+            <pc:sldMk cId="1547336493" sldId="690"/>
+            <ac:spMk id="6" creationId="{6800A3FA-C98F-470C-B249-AC7AFCD5482D}"/>
+          </ac:spMkLst>
+        </pc:spChg>
+      </pc:sldChg>
+      <pc:sldChg chg="modSp">
+        <pc:chgData name="McKenzie, Lloyd" userId="S::lloyd.mckenzie@ontariohealth.ca::4544ac19-90a7-4bc9-9dda-63119ceabc25" providerId="AD" clId="Web-{FC84101D-73EE-8C30-384A-8AB6C6315A8C}" dt="2025-02-07T18:23:44.057" v="20" actId="20577"/>
+        <pc:sldMkLst>
+          <pc:docMk/>
+          <pc:sldMk cId="1068210073" sldId="758"/>
+        </pc:sldMkLst>
+        <pc:spChg chg="mod">
+          <ac:chgData name="McKenzie, Lloyd" userId="S::lloyd.mckenzie@ontariohealth.ca::4544ac19-90a7-4bc9-9dda-63119ceabc25" providerId="AD" clId="Web-{FC84101D-73EE-8C30-384A-8AB6C6315A8C}" dt="2025-02-07T18:23:44.057" v="20" actId="20577"/>
+          <ac:spMkLst>
+            <pc:docMk/>
+            <pc:sldMk cId="1068210073" sldId="758"/>
+            <ac:spMk id="3" creationId="{265F06E4-AA8E-0233-8B95-FA7FA4341F19}"/>
+          </ac:spMkLst>
+        </pc:spChg>
+        <pc:spChg chg="mod">
+          <ac:chgData name="McKenzie, Lloyd" userId="S::lloyd.mckenzie@ontariohealth.ca::4544ac19-90a7-4bc9-9dda-63119ceabc25" providerId="AD" clId="Web-{FC84101D-73EE-8C30-384A-8AB6C6315A8C}" dt="2025-02-07T16:53:04.597" v="12"/>
+          <ac:spMkLst>
+            <pc:docMk/>
+            <pc:sldMk cId="1068210073" sldId="758"/>
+            <ac:spMk id="4" creationId="{E203CAF6-E711-E44D-32E7-0E369101B9FF}"/>
+          </ac:spMkLst>
+        </pc:spChg>
+      </pc:sldChg>
+      <pc:sldChg chg="modSp add">
+        <pc:chgData name="McKenzie, Lloyd" userId="S::lloyd.mckenzie@ontariohealth.ca::4544ac19-90a7-4bc9-9dda-63119ceabc25" providerId="AD" clId="Web-{FC84101D-73EE-8C30-384A-8AB6C6315A8C}" dt="2025-02-07T18:21:25.993" v="16" actId="20577"/>
+        <pc:sldMkLst>
+          <pc:docMk/>
+          <pc:sldMk cId="2030768388" sldId="797"/>
+        </pc:sldMkLst>
+        <pc:spChg chg="mod">
+          <ac:chgData name="McKenzie, Lloyd" userId="S::lloyd.mckenzie@ontariohealth.ca::4544ac19-90a7-4bc9-9dda-63119ceabc25" providerId="AD" clId="Web-{FC84101D-73EE-8C30-384A-8AB6C6315A8C}" dt="2025-02-07T18:21:25.993" v="16" actId="20577"/>
+          <ac:spMkLst>
+            <pc:docMk/>
+            <pc:sldMk cId="2030768388" sldId="797"/>
+            <ac:spMk id="2" creationId="{E265F639-6FEA-A56A-8782-FB04C81D81D5}"/>
+          </ac:spMkLst>
+        </pc:spChg>
+      </pc:sldChg>
+      <pc:sldChg chg="modSp">
+        <pc:chgData name="McKenzie, Lloyd" userId="S::lloyd.mckenzie@ontariohealth.ca::4544ac19-90a7-4bc9-9dda-63119ceabc25" providerId="AD" clId="Web-{FC84101D-73EE-8C30-384A-8AB6C6315A8C}" dt="2025-02-07T16:53:04.597" v="12"/>
+        <pc:sldMkLst>
+          <pc:docMk/>
+          <pc:sldMk cId="2805408624" sldId="4802"/>
+        </pc:sldMkLst>
+        <pc:spChg chg="mod">
+          <ac:chgData name="McKenzie, Lloyd" userId="S::lloyd.mckenzie@ontariohealth.ca::4544ac19-90a7-4bc9-9dda-63119ceabc25" providerId="AD" clId="Web-{FC84101D-73EE-8C30-384A-8AB6C6315A8C}" dt="2025-02-07T16:53:04.597" v="12"/>
+          <ac:spMkLst>
+            <pc:docMk/>
+            <pc:sldMk cId="2805408624" sldId="4802"/>
+            <ac:spMk id="4" creationId="{146EE1AE-A93F-AB55-8489-EA018C625A48}"/>
+          </ac:spMkLst>
+        </pc:spChg>
+      </pc:sldChg>
+      <pc:sldChg chg="modSp">
+        <pc:chgData name="McKenzie, Lloyd" userId="S::lloyd.mckenzie@ontariohealth.ca::4544ac19-90a7-4bc9-9dda-63119ceabc25" providerId="AD" clId="Web-{FC84101D-73EE-8C30-384A-8AB6C6315A8C}" dt="2025-02-07T16:53:04.597" v="12"/>
+        <pc:sldMkLst>
+          <pc:docMk/>
+          <pc:sldMk cId="2708608978" sldId="4810"/>
+        </pc:sldMkLst>
+        <pc:spChg chg="mod">
+          <ac:chgData name="McKenzie, Lloyd" userId="S::lloyd.mckenzie@ontariohealth.ca::4544ac19-90a7-4bc9-9dda-63119ceabc25" providerId="AD" clId="Web-{FC84101D-73EE-8C30-384A-8AB6C6315A8C}" dt="2025-02-07T16:53:04.597" v="12"/>
+          <ac:spMkLst>
+            <pc:docMk/>
+            <pc:sldMk cId="2708608978" sldId="4810"/>
+            <ac:spMk id="2" creationId="{2E434361-1D74-CFC0-B25B-156607EC81B6}"/>
+          </ac:spMkLst>
+        </pc:spChg>
+      </pc:sldChg>
+      <pc:sldChg chg="modSp">
+        <pc:chgData name="McKenzie, Lloyd" userId="S::lloyd.mckenzie@ontariohealth.ca::4544ac19-90a7-4bc9-9dda-63119ceabc25" providerId="AD" clId="Web-{FC84101D-73EE-8C30-384A-8AB6C6315A8C}" dt="2025-02-07T16:53:04.597" v="12"/>
+        <pc:sldMkLst>
+          <pc:docMk/>
+          <pc:sldMk cId="3091643366" sldId="4811"/>
+        </pc:sldMkLst>
+        <pc:spChg chg="mod">
+          <ac:chgData name="McKenzie, Lloyd" userId="S::lloyd.mckenzie@ontariohealth.ca::4544ac19-90a7-4bc9-9dda-63119ceabc25" providerId="AD" clId="Web-{FC84101D-73EE-8C30-384A-8AB6C6315A8C}" dt="2025-02-07T16:53:04.597" v="12"/>
+          <ac:spMkLst>
+            <pc:docMk/>
+            <pc:sldMk cId="3091643366" sldId="4811"/>
+            <ac:spMk id="4" creationId="{BCEE14B1-0C42-4AB0-526A-5D8C8B6AC860}"/>
+          </ac:spMkLst>
+        </pc:spChg>
+      </pc:sldChg>
+      <pc:sldChg chg="modSp">
+        <pc:chgData name="McKenzie, Lloyd" userId="S::lloyd.mckenzie@ontariohealth.ca::4544ac19-90a7-4bc9-9dda-63119ceabc25" providerId="AD" clId="Web-{FC84101D-73EE-8C30-384A-8AB6C6315A8C}" dt="2025-02-07T16:53:04.597" v="12"/>
+        <pc:sldMkLst>
+          <pc:docMk/>
+          <pc:sldMk cId="676814399" sldId="4812"/>
+        </pc:sldMkLst>
+        <pc:spChg chg="mod">
+          <ac:chgData name="McKenzie, Lloyd" userId="S::lloyd.mckenzie@ontariohealth.ca::4544ac19-90a7-4bc9-9dda-63119ceabc25" providerId="AD" clId="Web-{FC84101D-73EE-8C30-384A-8AB6C6315A8C}" dt="2025-02-07T16:53:04.597" v="12"/>
+          <ac:spMkLst>
+            <pc:docMk/>
+            <pc:sldMk cId="676814399" sldId="4812"/>
+            <ac:spMk id="4" creationId="{AD2BB4A2-6DD7-9AF7-CB0D-258144FF2379}"/>
+          </ac:spMkLst>
+        </pc:spChg>
+      </pc:sldChg>
+      <pc:sldChg chg="modSp">
+        <pc:chgData name="McKenzie, Lloyd" userId="S::lloyd.mckenzie@ontariohealth.ca::4544ac19-90a7-4bc9-9dda-63119ceabc25" providerId="AD" clId="Web-{FC84101D-73EE-8C30-384A-8AB6C6315A8C}" dt="2025-02-07T16:53:04.597" v="12"/>
+        <pc:sldMkLst>
+          <pc:docMk/>
+          <pc:sldMk cId="373007550" sldId="4813"/>
+        </pc:sldMkLst>
+        <pc:spChg chg="mod">
+          <ac:chgData name="McKenzie, Lloyd" userId="S::lloyd.mckenzie@ontariohealth.ca::4544ac19-90a7-4bc9-9dda-63119ceabc25" providerId="AD" clId="Web-{FC84101D-73EE-8C30-384A-8AB6C6315A8C}" dt="2025-02-07T16:53:04.597" v="12"/>
+          <ac:spMkLst>
+            <pc:docMk/>
+            <pc:sldMk cId="373007550" sldId="4813"/>
+            <ac:spMk id="4" creationId="{1A9C12C4-9155-E54A-944C-82F5CCBD3656}"/>
+          </ac:spMkLst>
+        </pc:spChg>
+      </pc:sldChg>
+      <pc:sldChg chg="modSp">
+        <pc:chgData name="McKenzie, Lloyd" userId="S::lloyd.mckenzie@ontariohealth.ca::4544ac19-90a7-4bc9-9dda-63119ceabc25" providerId="AD" clId="Web-{FC84101D-73EE-8C30-384A-8AB6C6315A8C}" dt="2025-02-07T16:53:04.597" v="12"/>
+        <pc:sldMkLst>
+          <pc:docMk/>
+          <pc:sldMk cId="3101138151" sldId="4814"/>
+        </pc:sldMkLst>
+        <pc:spChg chg="mod">
+          <ac:chgData name="McKenzie, Lloyd" userId="S::lloyd.mckenzie@ontariohealth.ca::4544ac19-90a7-4bc9-9dda-63119ceabc25" providerId="AD" clId="Web-{FC84101D-73EE-8C30-384A-8AB6C6315A8C}" dt="2025-02-07T16:53:04.597" v="12"/>
+          <ac:spMkLst>
+            <pc:docMk/>
+            <pc:sldMk cId="3101138151" sldId="4814"/>
+            <ac:spMk id="4" creationId="{7315CCF3-5919-D40C-72D0-ED331EE4980C}"/>
+          </ac:spMkLst>
+        </pc:spChg>
+      </pc:sldChg>
+      <pc:sldChg chg="modSp">
+        <pc:chgData name="McKenzie, Lloyd" userId="S::lloyd.mckenzie@ontariohealth.ca::4544ac19-90a7-4bc9-9dda-63119ceabc25" providerId="AD" clId="Web-{FC84101D-73EE-8C30-384A-8AB6C6315A8C}" dt="2025-02-07T16:53:04.597" v="12"/>
+        <pc:sldMkLst>
+          <pc:docMk/>
+          <pc:sldMk cId="1247397392" sldId="4815"/>
+        </pc:sldMkLst>
+        <pc:spChg chg="mod">
+          <ac:chgData name="McKenzie, Lloyd" userId="S::lloyd.mckenzie@ontariohealth.ca::4544ac19-90a7-4bc9-9dda-63119ceabc25" providerId="AD" clId="Web-{FC84101D-73EE-8C30-384A-8AB6C6315A8C}" dt="2025-02-07T16:53:04.597" v="12"/>
+          <ac:spMkLst>
+            <pc:docMk/>
+            <pc:sldMk cId="1247397392" sldId="4815"/>
+            <ac:spMk id="4" creationId="{AFD55B95-F090-ECE0-3C5B-E95086F7AC2A}"/>
+          </ac:spMkLst>
+        </pc:spChg>
+      </pc:sldChg>
+      <pc:sldChg chg="modSp">
+        <pc:chgData name="McKenzie, Lloyd" userId="S::lloyd.mckenzie@ontariohealth.ca::4544ac19-90a7-4bc9-9dda-63119ceabc25" providerId="AD" clId="Web-{FC84101D-73EE-8C30-384A-8AB6C6315A8C}" dt="2025-02-07T16:53:04.597" v="12"/>
+        <pc:sldMkLst>
+          <pc:docMk/>
+          <pc:sldMk cId="657887285" sldId="4816"/>
+        </pc:sldMkLst>
+        <pc:spChg chg="mod">
+          <ac:chgData name="McKenzie, Lloyd" userId="S::lloyd.mckenzie@ontariohealth.ca::4544ac19-90a7-4bc9-9dda-63119ceabc25" providerId="AD" clId="Web-{FC84101D-73EE-8C30-384A-8AB6C6315A8C}" dt="2025-02-07T16:53:04.597" v="12"/>
+          <ac:spMkLst>
+            <pc:docMk/>
+            <pc:sldMk cId="657887285" sldId="4816"/>
+            <ac:spMk id="4" creationId="{916FF461-A1FC-0922-EB69-7AFB8D245AC6}"/>
+          </ac:spMkLst>
+        </pc:spChg>
+      </pc:sldChg>
+      <pc:sldMasterChg chg="modSp addSldLayout modSldLayout">
+        <pc:chgData name="McKenzie, Lloyd" userId="S::lloyd.mckenzie@ontariohealth.ca::4544ac19-90a7-4bc9-9dda-63119ceabc25" providerId="AD" clId="Web-{FC84101D-73EE-8C30-384A-8AB6C6315A8C}" dt="2025-02-07T18:21:16.305" v="13"/>
+        <pc:sldMasterMkLst>
+          <pc:docMk/>
+          <pc:sldMasterMk cId="0" sldId="2147483648"/>
+        </pc:sldMasterMkLst>
+        <pc:spChg chg="mod">
+          <ac:chgData name="McKenzie, Lloyd" userId="S::lloyd.mckenzie@ontariohealth.ca::4544ac19-90a7-4bc9-9dda-63119ceabc25" providerId="AD" clId="Web-{FC84101D-73EE-8C30-384A-8AB6C6315A8C}" dt="2025-02-07T16:53:04.597" v="12"/>
+          <ac:spMkLst>
+            <pc:docMk/>
+            <pc:sldMasterMk cId="0" sldId="2147483648"/>
+            <ac:spMk id="5" creationId="{B9753632-C492-4515-B901-41AFB25873CC}"/>
+          </ac:spMkLst>
+        </pc:spChg>
+        <pc:sldLayoutChg chg="modSp">
+          <pc:chgData name="McKenzie, Lloyd" userId="S::lloyd.mckenzie@ontariohealth.ca::4544ac19-90a7-4bc9-9dda-63119ceabc25" providerId="AD" clId="Web-{FC84101D-73EE-8C30-384A-8AB6C6315A8C}" dt="2025-02-07T16:53:04.597" v="12"/>
+          <pc:sldLayoutMkLst>
+            <pc:docMk/>
+            <pc:sldMasterMk cId="0" sldId="2147483648"/>
+            <pc:sldLayoutMk cId="2237845615" sldId="2147483682"/>
+          </pc:sldLayoutMkLst>
+          <pc:spChg chg="mod">
+            <ac:chgData name="McKenzie, Lloyd" userId="S::lloyd.mckenzie@ontariohealth.ca::4544ac19-90a7-4bc9-9dda-63119ceabc25" providerId="AD" clId="Web-{FC84101D-73EE-8C30-384A-8AB6C6315A8C}" dt="2025-02-07T16:53:04.597" v="12"/>
+            <ac:spMkLst>
+              <pc:docMk/>
+              <pc:sldMasterMk cId="0" sldId="2147483648"/>
+              <pc:sldLayoutMk cId="2237845615" sldId="2147483682"/>
+              <ac:spMk id="8" creationId="{8E2087E9-637C-4C09-8985-3BAE95EB3A0C}"/>
+            </ac:spMkLst>
+          </pc:spChg>
+        </pc:sldLayoutChg>
+        <pc:sldLayoutChg chg="modSp">
+          <pc:chgData name="McKenzie, Lloyd" userId="S::lloyd.mckenzie@ontariohealth.ca::4544ac19-90a7-4bc9-9dda-63119ceabc25" providerId="AD" clId="Web-{FC84101D-73EE-8C30-384A-8AB6C6315A8C}" dt="2025-02-07T16:53:04.597" v="12"/>
+          <pc:sldLayoutMkLst>
+            <pc:docMk/>
+            <pc:sldMasterMk cId="0" sldId="2147483648"/>
+            <pc:sldLayoutMk cId="3769414896" sldId="2147483683"/>
+          </pc:sldLayoutMkLst>
+          <pc:spChg chg="mod">
+            <ac:chgData name="McKenzie, Lloyd" userId="S::lloyd.mckenzie@ontariohealth.ca::4544ac19-90a7-4bc9-9dda-63119ceabc25" providerId="AD" clId="Web-{FC84101D-73EE-8C30-384A-8AB6C6315A8C}" dt="2025-02-07T16:53:04.597" v="12"/>
+            <ac:spMkLst>
+              <pc:docMk/>
+              <pc:sldMasterMk cId="0" sldId="2147483648"/>
+              <pc:sldLayoutMk cId="3769414896" sldId="2147483683"/>
+              <ac:spMk id="8" creationId="{9170F17B-552A-4993-A6F0-1A6FE335872E}"/>
+            </ac:spMkLst>
+          </pc:spChg>
+        </pc:sldLayoutChg>
+        <pc:sldLayoutChg chg="modSp">
+          <pc:chgData name="McKenzie, Lloyd" userId="S::lloyd.mckenzie@ontariohealth.ca::4544ac19-90a7-4bc9-9dda-63119ceabc25" providerId="AD" clId="Web-{FC84101D-73EE-8C30-384A-8AB6C6315A8C}" dt="2025-02-07T16:53:04.597" v="12"/>
+          <pc:sldLayoutMkLst>
+            <pc:docMk/>
+            <pc:sldMasterMk cId="0" sldId="2147483648"/>
+            <pc:sldLayoutMk cId="2024429228" sldId="2147483684"/>
+          </pc:sldLayoutMkLst>
+          <pc:spChg chg="mod">
+            <ac:chgData name="McKenzie, Lloyd" userId="S::lloyd.mckenzie@ontariohealth.ca::4544ac19-90a7-4bc9-9dda-63119ceabc25" providerId="AD" clId="Web-{FC84101D-73EE-8C30-384A-8AB6C6315A8C}" dt="2025-02-07T16:53:04.597" v="12"/>
+            <ac:spMkLst>
+              <pc:docMk/>
+              <pc:sldMasterMk cId="0" sldId="2147483648"/>
+              <pc:sldLayoutMk cId="2024429228" sldId="2147483684"/>
+              <ac:spMk id="25" creationId="{6C4765DB-7105-45CC-BD97-DDD21BCA1C4A}"/>
+            </ac:spMkLst>
+          </pc:spChg>
+        </pc:sldLayoutChg>
+        <pc:sldLayoutChg chg="modSp">
+          <pc:chgData name="McKenzie, Lloyd" userId="S::lloyd.mckenzie@ontariohealth.ca::4544ac19-90a7-4bc9-9dda-63119ceabc25" providerId="AD" clId="Web-{FC84101D-73EE-8C30-384A-8AB6C6315A8C}" dt="2025-02-07T16:53:04.597" v="12"/>
+          <pc:sldLayoutMkLst>
+            <pc:docMk/>
+            <pc:sldMasterMk cId="0" sldId="2147483648"/>
+            <pc:sldLayoutMk cId="1828050307" sldId="2147483685"/>
+          </pc:sldLayoutMkLst>
+          <pc:spChg chg="mod">
+            <ac:chgData name="McKenzie, Lloyd" userId="S::lloyd.mckenzie@ontariohealth.ca::4544ac19-90a7-4bc9-9dda-63119ceabc25" providerId="AD" clId="Web-{FC84101D-73EE-8C30-384A-8AB6C6315A8C}" dt="2025-02-07T16:53:04.597" v="12"/>
+            <ac:spMkLst>
+              <pc:docMk/>
+              <pc:sldMasterMk cId="0" sldId="2147483648"/>
+              <pc:sldLayoutMk cId="1828050307" sldId="2147483685"/>
+              <ac:spMk id="41" creationId="{86364F0F-A2BB-480B-88A7-F41748072267}"/>
+            </ac:spMkLst>
+          </pc:spChg>
+        </pc:sldLayoutChg>
+        <pc:sldLayoutChg chg="modSp">
+          <pc:chgData name="McKenzie, Lloyd" userId="S::lloyd.mckenzie@ontariohealth.ca::4544ac19-90a7-4bc9-9dda-63119ceabc25" providerId="AD" clId="Web-{FC84101D-73EE-8C30-384A-8AB6C6315A8C}" dt="2025-02-07T16:53:04.597" v="12"/>
+          <pc:sldLayoutMkLst>
+            <pc:docMk/>
+            <pc:sldMasterMk cId="0" sldId="2147483648"/>
+            <pc:sldLayoutMk cId="4066057111" sldId="2147483686"/>
+          </pc:sldLayoutMkLst>
+          <pc:spChg chg="mod">
+            <ac:chgData name="McKenzie, Lloyd" userId="S::lloyd.mckenzie@ontariohealth.ca::4544ac19-90a7-4bc9-9dda-63119ceabc25" providerId="AD" clId="Web-{FC84101D-73EE-8C30-384A-8AB6C6315A8C}" dt="2025-02-07T16:53:04.597" v="12"/>
+            <ac:spMkLst>
+              <pc:docMk/>
+              <pc:sldMasterMk cId="0" sldId="2147483648"/>
+              <pc:sldLayoutMk cId="4066057111" sldId="2147483686"/>
+              <ac:spMk id="23" creationId="{3278E695-3242-46C8-A5D0-91F98BE1AA7A}"/>
+            </ac:spMkLst>
+          </pc:spChg>
+        </pc:sldLayoutChg>
+        <pc:sldLayoutChg chg="modSp">
+          <pc:chgData name="McKenzie, Lloyd" userId="S::lloyd.mckenzie@ontariohealth.ca::4544ac19-90a7-4bc9-9dda-63119ceabc25" providerId="AD" clId="Web-{FC84101D-73EE-8C30-384A-8AB6C6315A8C}" dt="2025-02-07T16:53:04.597" v="12"/>
+          <pc:sldLayoutMkLst>
+            <pc:docMk/>
+            <pc:sldMasterMk cId="0" sldId="2147483648"/>
+            <pc:sldLayoutMk cId="1509802494" sldId="2147483687"/>
+          </pc:sldLayoutMkLst>
+          <pc:spChg chg="mod">
+            <ac:chgData name="McKenzie, Lloyd" userId="S::lloyd.mckenzie@ontariohealth.ca::4544ac19-90a7-4bc9-9dda-63119ceabc25" providerId="AD" clId="Web-{FC84101D-73EE-8C30-384A-8AB6C6315A8C}" dt="2025-02-07T16:53:04.597" v="12"/>
+            <ac:spMkLst>
+              <pc:docMk/>
+              <pc:sldMasterMk cId="0" sldId="2147483648"/>
+              <pc:sldLayoutMk cId="1509802494" sldId="2147483687"/>
+              <ac:spMk id="27" creationId="{1B1954A0-3B1F-45BD-8FA9-A14758770218}"/>
+            </ac:spMkLst>
+          </pc:spChg>
+        </pc:sldLayoutChg>
+        <pc:sldLayoutChg chg="modSp">
+          <pc:chgData name="McKenzie, Lloyd" userId="S::lloyd.mckenzie@ontariohealth.ca::4544ac19-90a7-4bc9-9dda-63119ceabc25" providerId="AD" clId="Web-{FC84101D-73EE-8C30-384A-8AB6C6315A8C}" dt="2025-02-07T16:53:04.597" v="12"/>
+          <pc:sldLayoutMkLst>
+            <pc:docMk/>
+            <pc:sldMasterMk cId="0" sldId="2147483648"/>
+            <pc:sldLayoutMk cId="3002454115" sldId="2147483688"/>
+          </pc:sldLayoutMkLst>
+          <pc:spChg chg="mod">
+            <ac:chgData name="McKenzie, Lloyd" userId="S::lloyd.mckenzie@ontariohealth.ca::4544ac19-90a7-4bc9-9dda-63119ceabc25" providerId="AD" clId="Web-{FC84101D-73EE-8C30-384A-8AB6C6315A8C}" dt="2025-02-07T16:53:04.597" v="12"/>
+            <ac:spMkLst>
+              <pc:docMk/>
+              <pc:sldMasterMk cId="0" sldId="2147483648"/>
+              <pc:sldLayoutMk cId="3002454115" sldId="2147483688"/>
+              <ac:spMk id="27" creationId="{3E9F65D5-F0E8-4EA4-B4AD-024D025D4000}"/>
+            </ac:spMkLst>
+          </pc:spChg>
+        </pc:sldLayoutChg>
+        <pc:sldLayoutChg chg="modSp">
+          <pc:chgData name="McKenzie, Lloyd" userId="S::lloyd.mckenzie@ontariohealth.ca::4544ac19-90a7-4bc9-9dda-63119ceabc25" providerId="AD" clId="Web-{FC84101D-73EE-8C30-384A-8AB6C6315A8C}" dt="2025-02-07T16:53:04.597" v="12"/>
+          <pc:sldLayoutMkLst>
+            <pc:docMk/>
+            <pc:sldMasterMk cId="0" sldId="2147483648"/>
+            <pc:sldLayoutMk cId="2112457495" sldId="2147483689"/>
+          </pc:sldLayoutMkLst>
+          <pc:spChg chg="mod">
+            <ac:chgData name="McKenzie, Lloyd" userId="S::lloyd.mckenzie@ontariohealth.ca::4544ac19-90a7-4bc9-9dda-63119ceabc25" providerId="AD" clId="Web-{FC84101D-73EE-8C30-384A-8AB6C6315A8C}" dt="2025-02-07T16:53:04.597" v="12"/>
+            <ac:spMkLst>
+              <pc:docMk/>
+              <pc:sldMasterMk cId="0" sldId="2147483648"/>
+              <pc:sldLayoutMk cId="2112457495" sldId="2147483689"/>
+              <ac:spMk id="9" creationId="{50BB96CA-A2ED-4646-843D-EEE743521AEF}"/>
+            </ac:spMkLst>
+          </pc:spChg>
+        </pc:sldLayoutChg>
+        <pc:sldLayoutChg chg="modSp">
+          <pc:chgData name="McKenzie, Lloyd" userId="S::lloyd.mckenzie@ontariohealth.ca::4544ac19-90a7-4bc9-9dda-63119ceabc25" providerId="AD" clId="Web-{FC84101D-73EE-8C30-384A-8AB6C6315A8C}" dt="2025-02-07T16:53:04.597" v="12"/>
+          <pc:sldLayoutMkLst>
+            <pc:docMk/>
+            <pc:sldMasterMk cId="0" sldId="2147483648"/>
+            <pc:sldLayoutMk cId="2809160247" sldId="2147483690"/>
+          </pc:sldLayoutMkLst>
+          <pc:spChg chg="mod">
+            <ac:chgData name="McKenzie, Lloyd" userId="S::lloyd.mckenzie@ontariohealth.ca::4544ac19-90a7-4bc9-9dda-63119ceabc25" providerId="AD" clId="Web-{FC84101D-73EE-8C30-384A-8AB6C6315A8C}" dt="2025-02-07T16:53:04.597" v="12"/>
+            <ac:spMkLst>
+              <pc:docMk/>
+              <pc:sldMasterMk cId="0" sldId="2147483648"/>
+              <pc:sldLayoutMk cId="2809160247" sldId="2147483690"/>
+              <ac:spMk id="19" creationId="{736339CA-3043-4229-B59B-66EFA864600D}"/>
+            </ac:spMkLst>
+          </pc:spChg>
+        </pc:sldLayoutChg>
+        <pc:sldLayoutChg chg="modSp">
+          <pc:chgData name="McKenzie, Lloyd" userId="S::lloyd.mckenzie@ontariohealth.ca::4544ac19-90a7-4bc9-9dda-63119ceabc25" providerId="AD" clId="Web-{FC84101D-73EE-8C30-384A-8AB6C6315A8C}" dt="2025-02-07T16:53:04.597" v="12"/>
+          <pc:sldLayoutMkLst>
+            <pc:docMk/>
+            <pc:sldMasterMk cId="0" sldId="2147483648"/>
+            <pc:sldLayoutMk cId="4228695043" sldId="2147483699"/>
+          </pc:sldLayoutMkLst>
+          <pc:spChg chg="mod">
+            <ac:chgData name="McKenzie, Lloyd" userId="S::lloyd.mckenzie@ontariohealth.ca::4544ac19-90a7-4bc9-9dda-63119ceabc25" providerId="AD" clId="Web-{FC84101D-73EE-8C30-384A-8AB6C6315A8C}" dt="2025-02-07T16:53:04.597" v="12"/>
+            <ac:spMkLst>
+              <pc:docMk/>
+              <pc:sldMasterMk cId="0" sldId="2147483648"/>
+              <pc:sldLayoutMk cId="4228695043" sldId="2147483699"/>
+              <ac:spMk id="23" creationId="{3278E695-3242-46C8-A5D0-91F98BE1AA7A}"/>
+            </ac:spMkLst>
+          </pc:spChg>
+        </pc:sldLayoutChg>
+        <pc:sldLayoutChg chg="modSp">
+          <pc:chgData name="McKenzie, Lloyd" userId="S::lloyd.mckenzie@ontariohealth.ca::4544ac19-90a7-4bc9-9dda-63119ceabc25" providerId="AD" clId="Web-{FC84101D-73EE-8C30-384A-8AB6C6315A8C}" dt="2025-02-07T16:53:04.597" v="12"/>
+          <pc:sldLayoutMkLst>
+            <pc:docMk/>
+            <pc:sldMasterMk cId="0" sldId="2147483648"/>
+            <pc:sldLayoutMk cId="3475593088" sldId="2147483700"/>
+          </pc:sldLayoutMkLst>
+          <pc:spChg chg="mod">
+            <ac:chgData name="McKenzie, Lloyd" userId="S::lloyd.mckenzie@ontariohealth.ca::4544ac19-90a7-4bc9-9dda-63119ceabc25" providerId="AD" clId="Web-{FC84101D-73EE-8C30-384A-8AB6C6315A8C}" dt="2025-02-07T16:53:04.597" v="12"/>
+            <ac:spMkLst>
+              <pc:docMk/>
+              <pc:sldMasterMk cId="0" sldId="2147483648"/>
+              <pc:sldLayoutMk cId="3475593088" sldId="2147483700"/>
+              <ac:spMk id="23" creationId="{3278E695-3242-46C8-A5D0-91F98BE1AA7A}"/>
+            </ac:spMkLst>
+          </pc:spChg>
+        </pc:sldLayoutChg>
+        <pc:sldLayoutChg chg="add">
+          <pc:chgData name="McKenzie, Lloyd" userId="S::lloyd.mckenzie@ontariohealth.ca::4544ac19-90a7-4bc9-9dda-63119ceabc25" providerId="AD" clId="Web-{FC84101D-73EE-8C30-384A-8AB6C6315A8C}" dt="2025-02-07T18:21:16.305" v="13"/>
+          <pc:sldLayoutMkLst>
+            <pc:docMk/>
+            <pc:sldMasterMk cId="0" sldId="2147483648"/>
+            <pc:sldLayoutMk cId="3495972574" sldId="2147483707"/>
+          </pc:sldLayoutMkLst>
+        </pc:sldLayoutChg>
+      </pc:sldMasterChg>
+    </pc:docChg>
+  </pc:docChgLst>
+</pc:chgInfo>
+</file>
+
 <file path=ppt/handoutMasters/handoutMaster1.xml><?xml version="1.0" encoding="utf-8"?>
 <p:handoutMaster xmlns:a="http://schemas.openxmlformats.org/drawingml/2006/main" xmlns:r="http://schemas.openxmlformats.org/officeDocument/2006/relationships" xmlns:p="http://schemas.openxmlformats.org/presentationml/2006/main">
   <p:cSld>
@@ -313,7 +778,7 @@
             <a:fld id="{1BCE7D1B-E2D6-42EC-A46F-6B8D8AB722EA}" type="datetime1">
               <a:rPr lang="en-US" altLang="en-US"/>
               <a:pPr/>
-              <a:t>1/7/2025</a:t>
+              <a:t>2/17/2025</a:t>
             </a:fld>
             <a:endParaRPr lang="en-US" altLang="en-US"/>
           </a:p>
@@ -544,7 +1009,7 @@
             <a:fld id="{60D4D74E-7671-46E5-9A5B-14F31A4C0D2E}" type="datetime1">
               <a:rPr lang="en-US" altLang="en-US"/>
               <a:pPr/>
-              <a:t>1/7/2025</a:t>
+              <a:t>2/17/2025</a:t>
             </a:fld>
             <a:endParaRPr lang="en-US" altLang="en-US"/>
           </a:p>
@@ -881,99 +1346,6 @@
 </p:notesMaster>
 </file>
 
-<file path=ppt/notesSlides/notesSlide1.xml><?xml version="1.0" encoding="utf-8"?>
-<p:notes xmlns:a="http://schemas.openxmlformats.org/drawingml/2006/main" xmlns:r="http://schemas.openxmlformats.org/officeDocument/2006/relationships" xmlns:p="http://schemas.openxmlformats.org/presentationml/2006/main">
-  <p:cSld>
-    <p:spTree>
-      <p:nvGrpSpPr>
-        <p:cNvPr id="1" name=""/>
-        <p:cNvGrpSpPr/>
-        <p:nvPr/>
-      </p:nvGrpSpPr>
-      <p:grpSpPr>
-        <a:xfrm>
-          <a:off x="0" y="0"/>
-          <a:ext cx="0" cy="0"/>
-          <a:chOff x="0" y="0"/>
-          <a:chExt cx="0" cy="0"/>
-        </a:xfrm>
-      </p:grpSpPr>
-      <p:sp>
-        <p:nvSpPr>
-          <p:cNvPr id="7" name="Rectangle 7"/>
-          <p:cNvSpPr>
-            <a:spLocks noGrp="1" noChangeArrowheads="1"/>
-          </p:cNvSpPr>
-          <p:nvPr>
-            <p:ph type="sldNum" sz="quarter" idx="5"/>
-          </p:nvPr>
-        </p:nvSpPr>
-        <p:spPr>
-          <a:ln/>
-        </p:spPr>
-        <p:txBody>
-          <a:bodyPr/>
-          <a:lstStyle/>
-          <a:p>
-            <a:fld id="{38EFF599-57A5-464D-BBDE-DD73E3C700F9}" type="slidenum">
-              <a:rPr lang="en-US"/>
-              <a:pPr/>
-              <a:t>1</a:t>
-            </a:fld>
-            <a:endParaRPr lang="en-US"/>
-          </a:p>
-        </p:txBody>
-      </p:sp>
-      <p:sp>
-        <p:nvSpPr>
-          <p:cNvPr id="5122" name="Rectangle 2"/>
-          <p:cNvSpPr>
-            <a:spLocks noGrp="1" noRot="1" noChangeAspect="1" noChangeArrowheads="1" noTextEdit="1"/>
-          </p:cNvSpPr>
-          <p:nvPr>
-            <p:ph type="sldImg"/>
-          </p:nvPr>
-        </p:nvSpPr>
-        <p:spPr>
-          <a:xfrm>
-            <a:off x="381000" y="685800"/>
-            <a:ext cx="6096000" cy="3429000"/>
-          </a:xfrm>
-          <a:ln/>
-        </p:spPr>
-      </p:sp>
-      <p:sp>
-        <p:nvSpPr>
-          <p:cNvPr id="5123" name="Rectangle 3"/>
-          <p:cNvSpPr>
-            <a:spLocks noGrp="1" noChangeArrowheads="1"/>
-          </p:cNvSpPr>
-          <p:nvPr>
-            <p:ph type="body" idx="1"/>
-          </p:nvPr>
-        </p:nvSpPr>
-        <p:spPr/>
-        <p:txBody>
-          <a:bodyPr/>
-          <a:lstStyle/>
-          <a:p>
-            <a:endParaRPr lang="en-US"/>
-          </a:p>
-        </p:txBody>
-      </p:sp>
-    </p:spTree>
-    <p:extLst>
-      <p:ext uri="{BB962C8B-B14F-4D97-AF65-F5344CB8AC3E}">
-        <p14:creationId xmlns:p14="http://schemas.microsoft.com/office/powerpoint/2010/main" val="3535730783"/>
-      </p:ext>
-    </p:extLst>
-  </p:cSld>
-  <p:clrMapOvr>
-    <a:masterClrMapping/>
-  </p:clrMapOvr>
-</p:notes>
-</file>
-
 <file path=ppt/slideLayouts/slideLayout1.xml><?xml version="1.0" encoding="utf-8"?>
 <p:sldLayout xmlns:a="http://schemas.openxmlformats.org/drawingml/2006/main" xmlns:r="http://schemas.openxmlformats.org/officeDocument/2006/relationships" xmlns:p="http://schemas.openxmlformats.org/presentationml/2006/main" preserve="1" userDrawn="1">
   <p:cSld name="Title Slide">
@@ -1385,7 +1757,7 @@
           <a:p>
             <a:r>
               <a:rPr lang="en-CA" b="1" dirty="0"/>
-              <a:t>© 2024 Health Level Seven ® International. All Rights Reserved. Published under the Creative Commons 3.0 Attribution </a:t>
+              <a:t>© 2025 Health Level Seven ® International. All Rights Reserved. Published under the Creative Commons 3.0 Attribution </a:t>
             </a:r>
             <a:r>
               <a:rPr lang="en-CA" b="1" dirty="0" err="1"/>
@@ -2146,7 +2518,7 @@
           <a:p>
             <a:r>
               <a:rPr lang="en-CA" b="1" dirty="0"/>
-              <a:t>© 2024 Health Level Seven ® International. All Rights Reserved. Published under the Creative Commons 3.0 Attribution </a:t>
+              <a:t>© 2025 Health Level Seven ® International. All Rights Reserved. Published under the Creative Commons 3.0 Attribution </a:t>
             </a:r>
             <a:r>
               <a:rPr lang="en-CA" b="1" dirty="0" err="1"/>
@@ -2817,7 +3189,7 @@
           <a:p>
             <a:r>
               <a:rPr lang="en-CA" b="1" dirty="0"/>
-              <a:t>© 2024 Health Level Seven ® International. All Rights Reserved. Published under the Creative Commons 3.0 Attribution </a:t>
+              <a:t>© 2025 Health Level Seven ® International. All Rights Reserved. Published under the Creative Commons 3.0 Attribution </a:t>
             </a:r>
             <a:r>
               <a:rPr lang="en-CA" b="1" dirty="0" err="1"/>
@@ -3425,7 +3797,7 @@
           <a:p>
             <a:r>
               <a:rPr lang="en-CA" b="1" dirty="0"/>
-              <a:t>© 2024 Health Level Seven ® International. All Rights Reserved. Published under the Creative Commons 3.0 Attribution </a:t>
+              <a:t>© 2025 Health Level Seven ® International. All Rights Reserved. Published under the Creative Commons 3.0 Attribution </a:t>
             </a:r>
             <a:r>
               <a:rPr lang="en-CA" b="1" dirty="0" err="1"/>
@@ -4892,7 +5264,7 @@
           <a:p>
             <a:fld id="{D83995C2-806B-4997-8C0A-E780F2B14CC7}" type="datetimeFigureOut">
               <a:rPr lang="en-US" smtClean="0"/>
-              <a:t>1/7/2025</a:t>
+              <a:t>2/17/2025</a:t>
             </a:fld>
             <a:endParaRPr lang="en-US"/>
           </a:p>
@@ -4956,6 +5328,503 @@
     <p:extLst>
       <p:ext uri="{BB962C8B-B14F-4D97-AF65-F5344CB8AC3E}">
         <p14:creationId xmlns:p14="http://schemas.microsoft.com/office/powerpoint/2010/main" val="71163052"/>
+      </p:ext>
+    </p:extLst>
+  </p:cSld>
+  <p:clrMapOvr>
+    <a:masterClrMapping/>
+  </p:clrMapOvr>
+</p:sldLayout>
+</file>
+
+<file path=ppt/slideLayouts/slideLayout17.xml><?xml version="1.0" encoding="utf-8"?>
+<p:sldLayout xmlns:a="http://schemas.openxmlformats.org/drawingml/2006/main" xmlns:r="http://schemas.openxmlformats.org/officeDocument/2006/relationships" xmlns:p="http://schemas.openxmlformats.org/presentationml/2006/main" preserve="1">
+  <p:cSld name="Title Slide 2 - Photo Large">
+    <p:bg>
+      <p:bgPr>
+        <a:blipFill dpi="0" rotWithShape="1">
+          <a:blip r:embed="rId2">
+            <a:lum/>
+          </a:blip>
+          <a:srcRect/>
+          <a:stretch>
+            <a:fillRect/>
+          </a:stretch>
+        </a:blipFill>
+        <a:effectLst/>
+      </p:bgPr>
+    </p:bg>
+    <p:spTree>
+      <p:nvGrpSpPr>
+        <p:cNvPr id="1" name=""/>
+        <p:cNvGrpSpPr/>
+        <p:nvPr/>
+      </p:nvGrpSpPr>
+      <p:grpSpPr>
+        <a:xfrm>
+          <a:off x="0" y="0"/>
+          <a:ext cx="0" cy="0"/>
+          <a:chOff x="0" y="0"/>
+          <a:chExt cx="0" cy="0"/>
+        </a:xfrm>
+      </p:grpSpPr>
+      <p:sp>
+        <p:nvSpPr>
+          <p:cNvPr id="4" name="Text Placeholder 47">
+            <a:extLst>
+              <a:ext uri="{FF2B5EF4-FFF2-40B4-BE49-F238E27FC236}">
+                <a16:creationId xmlns:a16="http://schemas.microsoft.com/office/drawing/2014/main" id="{D350924A-494F-9580-8CE1-82EE38F3FB24}"/>
+              </a:ext>
+            </a:extLst>
+          </p:cNvPr>
+          <p:cNvSpPr>
+            <a:spLocks noGrp="1"/>
+          </p:cNvSpPr>
+          <p:nvPr>
+            <p:ph type="body" sz="quarter" idx="16" hasCustomPrompt="1"/>
+          </p:nvPr>
+        </p:nvSpPr>
+        <p:spPr>
+          <a:xfrm>
+            <a:off x="534075" y="4578144"/>
+            <a:ext cx="4057650" cy="233013"/>
+          </a:xfrm>
+        </p:spPr>
+        <p:txBody>
+          <a:bodyPr wrap="square" anchor="t">
+            <a:spAutoFit/>
+          </a:bodyPr>
+          <a:lstStyle>
+            <a:lvl1pPr marL="0" indent="0">
+              <a:buNone/>
+              <a:defRPr sz="1500">
+                <a:latin typeface="+mn-lt"/>
+              </a:defRPr>
+            </a:lvl1pPr>
+            <a:lvl2pPr>
+              <a:defRPr sz="1200">
+                <a:latin typeface="+mn-lt"/>
+              </a:defRPr>
+            </a:lvl2pPr>
+            <a:lvl3pPr>
+              <a:defRPr sz="1200">
+                <a:latin typeface="+mn-lt"/>
+              </a:defRPr>
+            </a:lvl3pPr>
+            <a:lvl4pPr>
+              <a:defRPr sz="1200">
+                <a:latin typeface="+mn-lt"/>
+              </a:defRPr>
+            </a:lvl4pPr>
+            <a:lvl5pPr>
+              <a:defRPr sz="1200">
+                <a:latin typeface="+mn-lt"/>
+              </a:defRPr>
+            </a:lvl5pPr>
+          </a:lstStyle>
+          <a:p>
+            <a:pPr>
+              <a:lnSpc>
+                <a:spcPts val="1979"/>
+              </a:lnSpc>
+              <a:spcAft>
+                <a:spcPts val="600"/>
+              </a:spcAft>
+            </a:pPr>
+            <a:r>
+              <a:rPr lang="en-US" altLang="en-US" sz="1200" u="none" dirty="0">
+                <a:latin typeface="Calibri"/>
+                <a:ea typeface="MS PGothic"/>
+                <a:cs typeface="Calibri"/>
+              </a:rPr>
+              <a:t>Presenter Name  </a:t>
+            </a:r>
+            <a:r>
+              <a:rPr lang="en-US" altLang="en-US" sz="1200" u="none" dirty="0">
+                <a:solidFill>
+                  <a:srgbClr val="047BC1"/>
+                </a:solidFill>
+                <a:latin typeface="Calibri"/>
+                <a:ea typeface="MS PGothic"/>
+                <a:cs typeface="Calibri"/>
+              </a:rPr>
+              <a:t>|</a:t>
+            </a:r>
+            <a:r>
+              <a:rPr lang="en-US" altLang="en-US" sz="1200" u="none" dirty="0">
+                <a:latin typeface="Calibri"/>
+                <a:ea typeface="MS PGothic"/>
+                <a:cs typeface="Calibri"/>
+              </a:rPr>
+              <a:t>  Date</a:t>
+            </a:r>
+            <a:endParaRPr lang="en-CA" altLang="en-US" sz="1200" u="none" dirty="0">
+              <a:latin typeface="Calibri" panose="020F0502020204030204" pitchFamily="34" charset="0"/>
+              <a:cs typeface="Calibri" panose="020F0502020204030204" pitchFamily="34" charset="0"/>
+            </a:endParaRPr>
+          </a:p>
+        </p:txBody>
+      </p:sp>
+      <p:sp>
+        <p:nvSpPr>
+          <p:cNvPr id="5" name="Text Placeholder 42">
+            <a:extLst>
+              <a:ext uri="{FF2B5EF4-FFF2-40B4-BE49-F238E27FC236}">
+                <a16:creationId xmlns:a16="http://schemas.microsoft.com/office/drawing/2014/main" id="{9A66CD2C-C71C-36A5-5711-07E6732387FF}"/>
+              </a:ext>
+            </a:extLst>
+          </p:cNvPr>
+          <p:cNvSpPr>
+            <a:spLocks noGrp="1"/>
+          </p:cNvSpPr>
+          <p:nvPr>
+            <p:ph type="body" sz="quarter" idx="14" hasCustomPrompt="1"/>
+          </p:nvPr>
+        </p:nvSpPr>
+        <p:spPr>
+          <a:xfrm>
+            <a:off x="534075" y="2756496"/>
+            <a:ext cx="4057650" cy="609398"/>
+          </a:xfrm>
+        </p:spPr>
+        <p:txBody>
+          <a:bodyPr wrap="square" anchor="t">
+            <a:spAutoFit/>
+          </a:bodyPr>
+          <a:lstStyle>
+            <a:lvl1pPr marL="0" indent="0">
+              <a:spcAft>
+                <a:spcPts val="0"/>
+              </a:spcAft>
+              <a:buNone/>
+              <a:defRPr sz="2250">
+                <a:latin typeface="+mj-lt"/>
+              </a:defRPr>
+            </a:lvl1pPr>
+            <a:lvl2pPr>
+              <a:defRPr sz="2250">
+                <a:latin typeface="+mj-lt"/>
+              </a:defRPr>
+            </a:lvl2pPr>
+            <a:lvl3pPr>
+              <a:defRPr sz="2250">
+                <a:latin typeface="+mj-lt"/>
+              </a:defRPr>
+            </a:lvl3pPr>
+            <a:lvl4pPr>
+              <a:defRPr sz="2250">
+                <a:latin typeface="+mj-lt"/>
+              </a:defRPr>
+            </a:lvl4pPr>
+            <a:lvl5pPr>
+              <a:defRPr sz="2250">
+                <a:latin typeface="+mj-lt"/>
+              </a:defRPr>
+            </a:lvl5pPr>
+          </a:lstStyle>
+          <a:p>
+            <a:pPr>
+              <a:lnSpc>
+                <a:spcPct val="88000"/>
+              </a:lnSpc>
+            </a:pPr>
+            <a:r>
+              <a:rPr lang="en-US" sz="2250" u="none" dirty="0">
+                <a:latin typeface="Calibri Light" panose="020F0302020204030204" pitchFamily="34" charset="0"/>
+                <a:ea typeface="MS PGothic"/>
+                <a:cs typeface="Calibri Light" panose="020F0302020204030204" pitchFamily="34" charset="0"/>
+              </a:rPr>
+              <a:t>Subheading goes here</a:t>
+            </a:r>
+            <a:br>
+              <a:rPr lang="en-US" sz="2250" u="none" dirty="0">
+                <a:latin typeface="Calibri Light" panose="020F0302020204030204" pitchFamily="34" charset="0"/>
+                <a:ea typeface="MS PGothic"/>
+                <a:cs typeface="Calibri Light" panose="020F0302020204030204" pitchFamily="34" charset="0"/>
+              </a:rPr>
+            </a:br>
+            <a:r>
+              <a:rPr lang="en-US" sz="2250" dirty="0">
+                <a:latin typeface="Calibri Light" panose="020F0302020204030204" pitchFamily="34" charset="0"/>
+                <a:ea typeface="MS PGothic"/>
+                <a:cs typeface="Calibri Light" panose="020F0302020204030204" pitchFamily="34" charset="0"/>
+              </a:rPr>
+              <a:t>Calibri 30 pt.</a:t>
+            </a:r>
+            <a:endParaRPr lang="en-US" sz="2250" u="none" dirty="0">
+              <a:latin typeface="Calibri Light" panose="020F0302020204030204" pitchFamily="34" charset="0"/>
+              <a:ea typeface="MS PGothic"/>
+              <a:cs typeface="Calibri Light" panose="020F0302020204030204" pitchFamily="34" charset="0"/>
+            </a:endParaRPr>
+          </a:p>
+        </p:txBody>
+      </p:sp>
+      <p:sp>
+        <p:nvSpPr>
+          <p:cNvPr id="7" name="Text Placeholder 37">
+            <a:extLst>
+              <a:ext uri="{FF2B5EF4-FFF2-40B4-BE49-F238E27FC236}">
+                <a16:creationId xmlns:a16="http://schemas.microsoft.com/office/drawing/2014/main" id="{95B5AC9A-8274-BF47-BC66-46041274E93A}"/>
+              </a:ext>
+            </a:extLst>
+          </p:cNvPr>
+          <p:cNvSpPr>
+            <a:spLocks noGrp="1"/>
+          </p:cNvSpPr>
+          <p:nvPr>
+            <p:ph type="body" sz="quarter" idx="17" hasCustomPrompt="1"/>
+          </p:nvPr>
+        </p:nvSpPr>
+        <p:spPr>
+          <a:xfrm>
+            <a:off x="534075" y="1593411"/>
+            <a:ext cx="4383157" cy="853167"/>
+          </a:xfrm>
+        </p:spPr>
+        <p:txBody>
+          <a:bodyPr wrap="square" anchor="b">
+            <a:spAutoFit/>
+          </a:bodyPr>
+          <a:lstStyle>
+            <a:lvl1pPr marL="0" indent="0">
+              <a:lnSpc>
+                <a:spcPct val="88000"/>
+              </a:lnSpc>
+              <a:spcBef>
+                <a:spcPts val="0"/>
+              </a:spcBef>
+              <a:spcAft>
+                <a:spcPts val="0"/>
+              </a:spcAft>
+              <a:buNone/>
+              <a:defRPr sz="3150" b="1"/>
+            </a:lvl1pPr>
+            <a:lvl2pPr marL="342900" indent="0">
+              <a:lnSpc>
+                <a:spcPct val="88000"/>
+              </a:lnSpc>
+              <a:buNone/>
+              <a:defRPr sz="3150" b="1"/>
+            </a:lvl2pPr>
+            <a:lvl3pPr marL="685800" indent="0">
+              <a:lnSpc>
+                <a:spcPct val="88000"/>
+              </a:lnSpc>
+              <a:buNone/>
+              <a:defRPr sz="3150" b="1"/>
+            </a:lvl3pPr>
+            <a:lvl4pPr marL="1028700" indent="0">
+              <a:lnSpc>
+                <a:spcPct val="88000"/>
+              </a:lnSpc>
+              <a:buNone/>
+              <a:defRPr sz="3150" b="1"/>
+            </a:lvl4pPr>
+            <a:lvl5pPr marL="1371600" indent="0">
+              <a:lnSpc>
+                <a:spcPct val="88000"/>
+              </a:lnSpc>
+              <a:buNone/>
+              <a:defRPr sz="3150" b="1"/>
+            </a:lvl5pPr>
+          </a:lstStyle>
+          <a:p>
+            <a:pPr>
+              <a:lnSpc>
+                <a:spcPct val="88000"/>
+              </a:lnSpc>
+              <a:spcAft>
+                <a:spcPts val="600"/>
+              </a:spcAft>
+            </a:pPr>
+            <a:r>
+              <a:rPr lang="en-US" sz="3150" b="1" u="none" dirty="0">
+                <a:latin typeface="Calibri"/>
+                <a:ea typeface="MS PGothic"/>
+                <a:cs typeface="Calibri"/>
+              </a:rPr>
+              <a:t>Presentation Title. </a:t>
+            </a:r>
+            <a:br>
+              <a:rPr lang="en-US" sz="3150" b="1" u="none" dirty="0">
+                <a:latin typeface="Calibri"/>
+                <a:ea typeface="MS PGothic"/>
+                <a:cs typeface="Calibri"/>
+              </a:rPr>
+            </a:br>
+            <a:r>
+              <a:rPr lang="en-US" sz="3150" b="1" u="none" dirty="0">
+                <a:latin typeface="Calibri"/>
+                <a:ea typeface="MS PGothic"/>
+                <a:cs typeface="Calibri"/>
+              </a:rPr>
+              <a:t>Can be 2-3 lines in length</a:t>
+            </a:r>
+            <a:endParaRPr lang="en-US" sz="3150" b="1" u="none" dirty="0">
+              <a:latin typeface="Calibri Light" panose="020F0302020204030204" pitchFamily="34" charset="0"/>
+              <a:ea typeface="MS PGothic"/>
+              <a:cs typeface="Calibri Light" panose="020F0302020204030204" pitchFamily="34" charset="0"/>
+            </a:endParaRPr>
+          </a:p>
+        </p:txBody>
+      </p:sp>
+      <p:sp>
+        <p:nvSpPr>
+          <p:cNvPr id="6" name="Rectangle 5">
+            <a:extLst>
+              <a:ext uri="{FF2B5EF4-FFF2-40B4-BE49-F238E27FC236}">
+                <a16:creationId xmlns:a16="http://schemas.microsoft.com/office/drawing/2014/main" id="{1D716EFD-F646-3881-9E4C-0455F945B4A4}"/>
+              </a:ext>
+              <a:ext uri="{C183D7F6-B498-43B3-948B-1728B52AA6E4}">
+                <adec:decorative xmlns:adec="http://schemas.microsoft.com/office/drawing/2017/decorative" val="1"/>
+              </a:ext>
+            </a:extLst>
+          </p:cNvPr>
+          <p:cNvSpPr/>
+          <p:nvPr/>
+        </p:nvSpPr>
+        <p:spPr>
+          <a:xfrm>
+            <a:off x="547721" y="2482414"/>
+            <a:ext cx="685800" cy="89154"/>
+          </a:xfrm>
+          <a:prstGeom prst="rect">
+            <a:avLst/>
+          </a:prstGeom>
+          <a:solidFill>
+            <a:schemeClr val="accent1"/>
+          </a:solidFill>
+          <a:ln>
+            <a:noFill/>
+          </a:ln>
+        </p:spPr>
+        <p:style>
+          <a:lnRef idx="2">
+            <a:schemeClr val="accent1">
+              <a:shade val="50000"/>
+            </a:schemeClr>
+          </a:lnRef>
+          <a:fillRef idx="1">
+            <a:schemeClr val="accent1"/>
+          </a:fillRef>
+          <a:effectRef idx="0">
+            <a:schemeClr val="accent1"/>
+          </a:effectRef>
+          <a:fontRef idx="minor">
+            <a:schemeClr val="lt1"/>
+          </a:fontRef>
+        </p:style>
+        <p:txBody>
+          <a:bodyPr lIns="137160" tIns="137160" rIns="137160" bIns="137160" rtlCol="0" anchor="t" anchorCtr="1"/>
+          <a:lstStyle/>
+          <a:p>
+            <a:pPr algn="l"/>
+            <a:endParaRPr lang="en-US" sz="1650" b="1" dirty="0">
+              <a:solidFill>
+                <a:schemeClr val="tx1"/>
+              </a:solidFill>
+              <a:latin typeface="Calibri" panose="020F0502020204030204" pitchFamily="34" charset="0"/>
+              <a:ea typeface="MS PGothic"/>
+              <a:cs typeface="Calibri" panose="020F0502020204030204" pitchFamily="34" charset="0"/>
+            </a:endParaRPr>
+          </a:p>
+        </p:txBody>
+      </p:sp>
+      <p:sp>
+        <p:nvSpPr>
+          <p:cNvPr id="2" name="Rectangle 1">
+            <a:extLst>
+              <a:ext uri="{FF2B5EF4-FFF2-40B4-BE49-F238E27FC236}">
+                <a16:creationId xmlns:a16="http://schemas.microsoft.com/office/drawing/2014/main" id="{DFC92F6B-E831-308F-C985-13BDB8D6318E}"/>
+              </a:ext>
+              <a:ext uri="{C183D7F6-B498-43B3-948B-1728B52AA6E4}">
+                <adec:decorative xmlns:adec="http://schemas.microsoft.com/office/drawing/2017/decorative" val="1"/>
+              </a:ext>
+            </a:extLst>
+          </p:cNvPr>
+          <p:cNvSpPr/>
+          <p:nvPr userDrawn="1"/>
+        </p:nvSpPr>
+        <p:spPr>
+          <a:xfrm>
+            <a:off x="547721" y="2482414"/>
+            <a:ext cx="685800" cy="89154"/>
+          </a:xfrm>
+          <a:prstGeom prst="rect">
+            <a:avLst/>
+          </a:prstGeom>
+          <a:solidFill>
+            <a:schemeClr val="accent1"/>
+          </a:solidFill>
+          <a:ln>
+            <a:noFill/>
+          </a:ln>
+        </p:spPr>
+        <p:style>
+          <a:lnRef idx="2">
+            <a:schemeClr val="accent1">
+              <a:shade val="50000"/>
+            </a:schemeClr>
+          </a:lnRef>
+          <a:fillRef idx="1">
+            <a:schemeClr val="accent1"/>
+          </a:fillRef>
+          <a:effectRef idx="0">
+            <a:schemeClr val="accent1"/>
+          </a:effectRef>
+          <a:fontRef idx="minor">
+            <a:schemeClr val="lt1"/>
+          </a:fontRef>
+        </p:style>
+        <p:txBody>
+          <a:bodyPr lIns="137160" tIns="137160" rIns="137160" bIns="137160" rtlCol="0" anchor="t" anchorCtr="1"/>
+          <a:lstStyle/>
+          <a:p>
+            <a:pPr algn="l"/>
+            <a:endParaRPr lang="en-US" sz="1650" b="1" dirty="0">
+              <a:solidFill>
+                <a:schemeClr val="tx1"/>
+              </a:solidFill>
+              <a:latin typeface="Calibri" panose="020F0502020204030204" pitchFamily="34" charset="0"/>
+              <a:ea typeface="MS PGothic"/>
+              <a:cs typeface="Calibri" panose="020F0502020204030204" pitchFamily="34" charset="0"/>
+            </a:endParaRPr>
+          </a:p>
+        </p:txBody>
+      </p:sp>
+      <p:pic>
+        <p:nvPicPr>
+          <p:cNvPr id="8" name="Picture 7">
+            <a:extLst>
+              <a:ext uri="{FF2B5EF4-FFF2-40B4-BE49-F238E27FC236}">
+                <a16:creationId xmlns:a16="http://schemas.microsoft.com/office/drawing/2014/main" id="{2135E3E3-D409-BCAE-B326-682ADC262DF2}"/>
+              </a:ext>
+            </a:extLst>
+          </p:cNvPr>
+          <p:cNvPicPr>
+            <a:picLocks noChangeAspect="1"/>
+          </p:cNvPicPr>
+          <p:nvPr userDrawn="1"/>
+        </p:nvPicPr>
+        <p:blipFill>
+          <a:blip r:embed="rId3"/>
+          <a:srcRect/>
+          <a:stretch/>
+        </p:blipFill>
+        <p:spPr>
+          <a:xfrm>
+            <a:off x="7141722" y="4160771"/>
+            <a:ext cx="2002278" cy="980895"/>
+          </a:xfrm>
+          <a:prstGeom prst="rect">
+            <a:avLst/>
+          </a:prstGeom>
+        </p:spPr>
+      </p:pic>
+    </p:spTree>
+    <p:extLst>
+      <p:ext uri="{BB962C8B-B14F-4D97-AF65-F5344CB8AC3E}">
+        <p14:creationId xmlns:p14="http://schemas.microsoft.com/office/powerpoint/2010/main" val="3495972574"/>
       </p:ext>
     </p:extLst>
   </p:cSld>
@@ -5303,7 +6172,7 @@
           <a:p>
             <a:r>
               <a:rPr lang="en-CA" b="1" dirty="0"/>
-              <a:t>© 2024 Health Level Seven ® International. All Rights Reserved. Published under the Creative Commons 3.0 Attribution </a:t>
+              <a:t>© 2025 Health Level Seven ® International. All Rights Reserved. Published under the Creative Commons 3.0 Attribution </a:t>
             </a:r>
             <a:r>
               <a:rPr lang="en-CA" b="1" dirty="0" err="1"/>
@@ -5865,7 +6734,7 @@
           <a:p>
             <a:r>
               <a:rPr lang="en-CA" b="1" dirty="0"/>
-              <a:t>© 2024 Health Level Seven ® International. All Rights Reserved. Published under the Creative Commons 3.0 Attribution </a:t>
+              <a:t>© 2025 Health Level Seven ® International. All Rights Reserved. Published under the Creative Commons 3.0 Attribution </a:t>
             </a:r>
             <a:r>
               <a:rPr lang="en-CA" b="1" dirty="0" err="1"/>
@@ -6365,7 +7234,7 @@
           <a:p>
             <a:r>
               <a:rPr lang="en-CA" b="1" dirty="0"/>
-              <a:t>© 2024 Health Level Seven ® International. All Rights Reserved. Published under the Creative Commons 3.0 Attribution </a:t>
+              <a:t>© 2025 Health Level Seven ® International. All Rights Reserved. Published under the Creative Commons 3.0 Attribution </a:t>
             </a:r>
             <a:r>
               <a:rPr lang="en-CA" b="1" dirty="0" err="1"/>
@@ -6865,7 +7734,7 @@
           <a:p>
             <a:r>
               <a:rPr lang="en-CA" b="1" dirty="0"/>
-              <a:t>© 2024 Health Level Seven ® International. All Rights Reserved. Published under the Creative Commons 3.0 Attribution </a:t>
+              <a:t>© 2025 Health Level Seven ® International. All Rights Reserved. Published under the Creative Commons 3.0 Attribution </a:t>
             </a:r>
             <a:r>
               <a:rPr lang="en-CA" b="1" dirty="0" err="1"/>
@@ -7608,7 +8477,7 @@
           <a:p>
             <a:r>
               <a:rPr lang="en-CA" b="1" dirty="0"/>
-              <a:t>© 2024 Health Level Seven ® International. All Rights Reserved. Published under the Creative Commons 3.0 Attribution </a:t>
+              <a:t>© 2025 Health Level Seven ® International. All Rights Reserved. Published under the Creative Commons 3.0 Attribution </a:t>
             </a:r>
             <a:r>
               <a:rPr lang="en-CA" b="1" dirty="0" err="1"/>
@@ -8599,7 +9468,7 @@
           <a:p>
             <a:r>
               <a:rPr lang="en-CA" b="1" dirty="0"/>
-              <a:t>© 2024 Health Level Seven ® International. All Rights Reserved. Published under the Creative Commons 3.0 Attribution </a:t>
+              <a:t>© 2025 Health Level Seven ® International. All Rights Reserved. Published under the Creative Commons 3.0 Attribution </a:t>
             </a:r>
             <a:r>
               <a:rPr lang="en-CA" b="1" dirty="0" err="1"/>
@@ -9408,7 +10277,7 @@
           <a:p>
             <a:r>
               <a:rPr lang="en-CA" b="1" dirty="0"/>
-              <a:t>© 2024 Health Level Seven ® International. All Rights Reserved. Published under the Creative Commons 3.0 Attribution </a:t>
+              <a:t>© 2025 Health Level Seven ® International. All Rights Reserved. Published under the Creative Commons 3.0 Attribution </a:t>
             </a:r>
             <a:r>
               <a:rPr lang="en-CA" b="1" dirty="0" err="1"/>
@@ -9947,7 +10816,7 @@
           <a:p>
             <a:r>
               <a:rPr lang="en-CA" b="1" dirty="0"/>
-              <a:t>© 2024 Health Level Seven ® International. All Rights Reserved. Published under the Creative Commons 3.0 Attribution </a:t>
+              <a:t>© 2025 Health Level Seven ® International. All Rights Reserved. Published under the Creative Commons 3.0 Attribution </a:t>
             </a:r>
             <a:r>
               <a:rPr lang="en-CA" b="1" dirty="0" err="1"/>
@@ -10029,6 +10898,7 @@
     <p:sldLayoutId id="2147483702" r:id="rId14"/>
     <p:sldLayoutId id="2147483704" r:id="rId15"/>
     <p:sldLayoutId id="2147483706" r:id="rId16"/>
+    <p:sldLayoutId id="2147483707" r:id="rId17"/>
   </p:sldLayoutIdLst>
   <p:hf hdr="0" dt="0"/>
   <p:txStyles>
@@ -10424,6 +11294,20 @@
 <file path=ppt/slides/slide1.xml><?xml version="1.0" encoding="utf-8"?>
 <p:sld xmlns:a="http://schemas.openxmlformats.org/drawingml/2006/main" xmlns:r="http://schemas.openxmlformats.org/officeDocument/2006/relationships" xmlns:p="http://schemas.openxmlformats.org/presentationml/2006/main">
   <p:cSld>
+    <p:bg>
+      <p:bgPr>
+        <a:blipFill dpi="0" rotWithShape="1">
+          <a:blip r:embed="rId2">
+            <a:lum/>
+          </a:blip>
+          <a:srcRect/>
+          <a:stretch>
+            <a:fillRect/>
+          </a:stretch>
+        </a:blipFill>
+        <a:effectLst/>
+      </p:bgPr>
+    </p:bg>
     <p:spTree>
       <p:nvGrpSpPr>
         <p:cNvPr id="1" name=""/>
@@ -10440,22 +11324,129 @@
       </p:grpSpPr>
       <p:sp>
         <p:nvSpPr>
-          <p:cNvPr id="3" name="Title 2"/>
+          <p:cNvPr id="6" name="Text Placeholder 5">
+            <a:extLst>
+              <a:ext uri="{FF2B5EF4-FFF2-40B4-BE49-F238E27FC236}">
+                <a16:creationId xmlns:a16="http://schemas.microsoft.com/office/drawing/2014/main" id="{32A55B74-6F49-9F22-9178-DE37CD82D03E}"/>
+              </a:ext>
+            </a:extLst>
+          </p:cNvPr>
           <p:cNvSpPr>
             <a:spLocks noGrp="1"/>
           </p:cNvSpPr>
           <p:nvPr>
-            <p:ph type="ctrTitle"/>
+            <p:ph type="body" sz="quarter" idx="16"/>
           </p:nvPr>
         </p:nvSpPr>
-        <p:spPr/>
+        <p:spPr>
+          <a:xfrm>
+            <a:off x="534075" y="4603166"/>
+            <a:ext cx="4057650" cy="207749"/>
+          </a:xfrm>
+        </p:spPr>
         <p:txBody>
           <a:bodyPr/>
-          <a:lstStyle/>
-          <a:p>
-            <a:r>
-              <a:rPr lang="en-AU" dirty="0"/>
-              <a:t>Structured Data Capture</a:t>
+          <a:lstStyle>
+            <a:defPPr>
+              <a:defRPr lang="en-US"/>
+            </a:defPPr>
+            <a:lvl1pPr marL="0" algn="l" defTabSz="685800" rtl="0" eaLnBrk="1" latinLnBrk="0" hangingPunct="1">
+              <a:defRPr sz="1350" kern="1200">
+                <a:solidFill>
+                  <a:schemeClr val="tx1"/>
+                </a:solidFill>
+                <a:latin typeface="+mn-lt"/>
+                <a:ea typeface="+mn-ea"/>
+                <a:cs typeface="+mn-cs"/>
+              </a:defRPr>
+            </a:lvl1pPr>
+            <a:lvl2pPr marL="342900" algn="l" defTabSz="685800" rtl="0" eaLnBrk="1" latinLnBrk="0" hangingPunct="1">
+              <a:defRPr sz="1350" kern="1200">
+                <a:solidFill>
+                  <a:schemeClr val="tx1"/>
+                </a:solidFill>
+                <a:latin typeface="+mn-lt"/>
+                <a:ea typeface="+mn-ea"/>
+                <a:cs typeface="+mn-cs"/>
+              </a:defRPr>
+            </a:lvl2pPr>
+            <a:lvl3pPr marL="685800" algn="l" defTabSz="685800" rtl="0" eaLnBrk="1" latinLnBrk="0" hangingPunct="1">
+              <a:defRPr sz="1350" kern="1200">
+                <a:solidFill>
+                  <a:schemeClr val="tx1"/>
+                </a:solidFill>
+                <a:latin typeface="+mn-lt"/>
+                <a:ea typeface="+mn-ea"/>
+                <a:cs typeface="+mn-cs"/>
+              </a:defRPr>
+            </a:lvl3pPr>
+            <a:lvl4pPr marL="1028700" algn="l" defTabSz="685800" rtl="0" eaLnBrk="1" latinLnBrk="0" hangingPunct="1">
+              <a:defRPr sz="1350" kern="1200">
+                <a:solidFill>
+                  <a:schemeClr val="tx1"/>
+                </a:solidFill>
+                <a:latin typeface="+mn-lt"/>
+                <a:ea typeface="+mn-ea"/>
+                <a:cs typeface="+mn-cs"/>
+              </a:defRPr>
+            </a:lvl4pPr>
+            <a:lvl5pPr marL="1371600" algn="l" defTabSz="685800" rtl="0" eaLnBrk="1" latinLnBrk="0" hangingPunct="1">
+              <a:defRPr sz="1350" kern="1200">
+                <a:solidFill>
+                  <a:schemeClr val="tx1"/>
+                </a:solidFill>
+                <a:latin typeface="+mn-lt"/>
+                <a:ea typeface="+mn-ea"/>
+                <a:cs typeface="+mn-cs"/>
+              </a:defRPr>
+            </a:lvl5pPr>
+            <a:lvl6pPr marL="1714500" algn="l" defTabSz="685800" rtl="0" eaLnBrk="1" latinLnBrk="0" hangingPunct="1">
+              <a:defRPr sz="1350" kern="1200">
+                <a:solidFill>
+                  <a:schemeClr val="tx1"/>
+                </a:solidFill>
+                <a:latin typeface="+mn-lt"/>
+                <a:ea typeface="+mn-ea"/>
+                <a:cs typeface="+mn-cs"/>
+              </a:defRPr>
+            </a:lvl6pPr>
+            <a:lvl7pPr marL="2057400" algn="l" defTabSz="685800" rtl="0" eaLnBrk="1" latinLnBrk="0" hangingPunct="1">
+              <a:defRPr sz="1350" kern="1200">
+                <a:solidFill>
+                  <a:schemeClr val="tx1"/>
+                </a:solidFill>
+                <a:latin typeface="+mn-lt"/>
+                <a:ea typeface="+mn-ea"/>
+                <a:cs typeface="+mn-cs"/>
+              </a:defRPr>
+            </a:lvl7pPr>
+            <a:lvl8pPr marL="2400300" algn="l" defTabSz="685800" rtl="0" eaLnBrk="1" latinLnBrk="0" hangingPunct="1">
+              <a:defRPr sz="1350" kern="1200">
+                <a:solidFill>
+                  <a:schemeClr val="tx1"/>
+                </a:solidFill>
+                <a:latin typeface="+mn-lt"/>
+                <a:ea typeface="+mn-ea"/>
+                <a:cs typeface="+mn-cs"/>
+              </a:defRPr>
+            </a:lvl8pPr>
+            <a:lvl9pPr marL="2743200" algn="l" defTabSz="685800" rtl="0" eaLnBrk="1" latinLnBrk="0" hangingPunct="1">
+              <a:defRPr sz="1350" kern="1200">
+                <a:solidFill>
+                  <a:schemeClr val="tx1"/>
+                </a:solidFill>
+                <a:latin typeface="+mn-lt"/>
+                <a:ea typeface="+mn-ea"/>
+                <a:cs typeface="+mn-cs"/>
+              </a:defRPr>
+            </a:lvl9pPr>
+          </a:lstStyle>
+          <a:p>
+            <a:r>
+              <a:rPr lang="en-US" dirty="0">
+                <a:cs typeface="Arial"/>
+              </a:rPr>
+              <a:t>Lloyd McKenzie | February 2025</a:t>
             </a:r>
             <a:endParaRPr lang="en-US" dirty="0"/>
           </a:p>
@@ -10463,32 +11454,140 @@
       </p:sp>
       <p:sp>
         <p:nvSpPr>
-          <p:cNvPr id="4" name="Subtitle 3"/>
+          <p:cNvPr id="2" name="Text Placeholder 1">
+            <a:extLst>
+              <a:ext uri="{FF2B5EF4-FFF2-40B4-BE49-F238E27FC236}">
+                <a16:creationId xmlns:a16="http://schemas.microsoft.com/office/drawing/2014/main" id="{E265F639-6FEA-A56A-8782-FB04C81D81D5}"/>
+              </a:ext>
+            </a:extLst>
+          </p:cNvPr>
           <p:cNvSpPr>
             <a:spLocks noGrp="1"/>
           </p:cNvSpPr>
           <p:nvPr>
-            <p:ph type="subTitle" idx="1"/>
+            <p:ph type="body" sz="quarter" idx="14"/>
           </p:nvPr>
         </p:nvSpPr>
-        <p:spPr/>
+        <p:spPr>
+          <a:xfrm>
+            <a:off x="534075" y="2756496"/>
+            <a:ext cx="4057650" cy="207749"/>
+          </a:xfrm>
+        </p:spPr>
         <p:txBody>
           <a:bodyPr/>
-          <a:lstStyle/>
-          <a:p>
-            <a:r>
-              <a:rPr lang="en-US" altLang="en-US" dirty="0"/>
+          <a:lstStyle>
+            <a:defPPr>
+              <a:defRPr lang="en-US"/>
+            </a:defPPr>
+            <a:lvl1pPr marL="0" algn="l" defTabSz="685800" rtl="0" eaLnBrk="1" latinLnBrk="0" hangingPunct="1">
+              <a:defRPr sz="1350" kern="1200">
+                <a:solidFill>
+                  <a:schemeClr val="tx1"/>
+                </a:solidFill>
+                <a:latin typeface="+mn-lt"/>
+                <a:ea typeface="+mn-ea"/>
+                <a:cs typeface="+mn-cs"/>
+              </a:defRPr>
+            </a:lvl1pPr>
+            <a:lvl2pPr marL="342900" algn="l" defTabSz="685800" rtl="0" eaLnBrk="1" latinLnBrk="0" hangingPunct="1">
+              <a:defRPr sz="1350" kern="1200">
+                <a:solidFill>
+                  <a:schemeClr val="tx1"/>
+                </a:solidFill>
+                <a:latin typeface="+mn-lt"/>
+                <a:ea typeface="+mn-ea"/>
+                <a:cs typeface="+mn-cs"/>
+              </a:defRPr>
+            </a:lvl2pPr>
+            <a:lvl3pPr marL="685800" algn="l" defTabSz="685800" rtl="0" eaLnBrk="1" latinLnBrk="0" hangingPunct="1">
+              <a:defRPr sz="1350" kern="1200">
+                <a:solidFill>
+                  <a:schemeClr val="tx1"/>
+                </a:solidFill>
+                <a:latin typeface="+mn-lt"/>
+                <a:ea typeface="+mn-ea"/>
+                <a:cs typeface="+mn-cs"/>
+              </a:defRPr>
+            </a:lvl3pPr>
+            <a:lvl4pPr marL="1028700" algn="l" defTabSz="685800" rtl="0" eaLnBrk="1" latinLnBrk="0" hangingPunct="1">
+              <a:defRPr sz="1350" kern="1200">
+                <a:solidFill>
+                  <a:schemeClr val="tx1"/>
+                </a:solidFill>
+                <a:latin typeface="+mn-lt"/>
+                <a:ea typeface="+mn-ea"/>
+                <a:cs typeface="+mn-cs"/>
+              </a:defRPr>
+            </a:lvl4pPr>
+            <a:lvl5pPr marL="1371600" algn="l" defTabSz="685800" rtl="0" eaLnBrk="1" latinLnBrk="0" hangingPunct="1">
+              <a:defRPr sz="1350" kern="1200">
+                <a:solidFill>
+                  <a:schemeClr val="tx1"/>
+                </a:solidFill>
+                <a:latin typeface="+mn-lt"/>
+                <a:ea typeface="+mn-ea"/>
+                <a:cs typeface="+mn-cs"/>
+              </a:defRPr>
+            </a:lvl5pPr>
+            <a:lvl6pPr marL="1714500" algn="l" defTabSz="685800" rtl="0" eaLnBrk="1" latinLnBrk="0" hangingPunct="1">
+              <a:defRPr sz="1350" kern="1200">
+                <a:solidFill>
+                  <a:schemeClr val="tx1"/>
+                </a:solidFill>
+                <a:latin typeface="+mn-lt"/>
+                <a:ea typeface="+mn-ea"/>
+                <a:cs typeface="+mn-cs"/>
+              </a:defRPr>
+            </a:lvl6pPr>
+            <a:lvl7pPr marL="2057400" algn="l" defTabSz="685800" rtl="0" eaLnBrk="1" latinLnBrk="0" hangingPunct="1">
+              <a:defRPr sz="1350" kern="1200">
+                <a:solidFill>
+                  <a:schemeClr val="tx1"/>
+                </a:solidFill>
+                <a:latin typeface="+mn-lt"/>
+                <a:ea typeface="+mn-ea"/>
+                <a:cs typeface="+mn-cs"/>
+              </a:defRPr>
+            </a:lvl7pPr>
+            <a:lvl8pPr marL="2400300" algn="l" defTabSz="685800" rtl="0" eaLnBrk="1" latinLnBrk="0" hangingPunct="1">
+              <a:defRPr sz="1350" kern="1200">
+                <a:solidFill>
+                  <a:schemeClr val="tx1"/>
+                </a:solidFill>
+                <a:latin typeface="+mn-lt"/>
+                <a:ea typeface="+mn-ea"/>
+                <a:cs typeface="+mn-cs"/>
+              </a:defRPr>
+            </a:lvl8pPr>
+            <a:lvl9pPr marL="2743200" algn="l" defTabSz="685800" rtl="0" eaLnBrk="1" latinLnBrk="0" hangingPunct="1">
+              <a:defRPr sz="1350" kern="1200">
+                <a:solidFill>
+                  <a:schemeClr val="tx1"/>
+                </a:solidFill>
+                <a:latin typeface="+mn-lt"/>
+                <a:ea typeface="+mn-ea"/>
+                <a:cs typeface="+mn-cs"/>
+              </a:defRPr>
+            </a:lvl9pPr>
+          </a:lstStyle>
+          <a:p>
+            <a:r>
+              <a:rPr lang="en-US" dirty="0">
+                <a:cs typeface="Arial"/>
+              </a:rPr>
               <a:t>Rendering &amp; Behavior</a:t>
             </a:r>
+            <a:endParaRPr lang="en-US" dirty="0"/>
           </a:p>
         </p:txBody>
       </p:sp>
       <p:sp>
         <p:nvSpPr>
-          <p:cNvPr id="8" name="Text Placeholder 7">
-            <a:extLst>
-              <a:ext uri="{FF2B5EF4-FFF2-40B4-BE49-F238E27FC236}">
-                <a16:creationId xmlns:a16="http://schemas.microsoft.com/office/drawing/2014/main" id="{62EAEE4D-DFDC-4EFC-B01D-4E1EAA084740}"/>
+          <p:cNvPr id="7" name="Text Placeholder 6">
+            <a:extLst>
+              <a:ext uri="{FF2B5EF4-FFF2-40B4-BE49-F238E27FC236}">
+                <a16:creationId xmlns:a16="http://schemas.microsoft.com/office/drawing/2014/main" id="{4F7F09CA-AAA3-4BE6-D1C9-77D304F05A8A}"/>
               </a:ext>
             </a:extLst>
           </p:cNvPr>
@@ -10496,103 +11595,157 @@
             <a:spLocks noGrp="1"/>
           </p:cNvSpPr>
           <p:nvPr>
-            <p:ph type="body" sz="quarter" idx="10"/>
-          </p:nvPr>
-        </p:nvSpPr>
-        <p:spPr/>
-        <p:txBody>
-          <a:bodyPr/>
-          <a:lstStyle/>
-          <a:p>
-            <a:r>
-              <a:rPr lang="en-US" dirty="0"/>
-              <a:t>Lloyd McKenzie</a:t>
-            </a:r>
-          </a:p>
-          <a:p>
-            <a:r>
-              <a:rPr lang="en-US" dirty="0"/>
-              <a:t>??Date??</a:t>
-            </a:r>
-          </a:p>
-        </p:txBody>
-      </p:sp>
-      <p:sp>
-        <p:nvSpPr>
-          <p:cNvPr id="2" name="Footer Placeholder 1">
-            <a:extLst>
-              <a:ext uri="{FF2B5EF4-FFF2-40B4-BE49-F238E27FC236}">
-                <a16:creationId xmlns:a16="http://schemas.microsoft.com/office/drawing/2014/main" id="{2DB8BFEF-A591-4AA8-9418-E34A204D637F}"/>
-              </a:ext>
-            </a:extLst>
-          </p:cNvPr>
-          <p:cNvSpPr>
-            <a:spLocks noGrp="1"/>
-          </p:cNvSpPr>
-          <p:nvPr>
-            <p:ph type="ftr" sz="quarter" idx="11"/>
-          </p:nvPr>
-        </p:nvSpPr>
-        <p:spPr/>
-        <p:txBody>
-          <a:bodyPr/>
-          <a:lstStyle/>
-          <a:p>
-            <a:r>
-              <a:rPr lang="en-CA" dirty="0"/>
-              <a:t>© 2024 Health Level Seven ® International. All Rights Reserved. Published under the Creative Commons 3.0 Attribution </a:t>
-            </a:r>
-            <a:r>
-              <a:rPr lang="en-CA" dirty="0" err="1"/>
-              <a:t>Unported</a:t>
-            </a:r>
-            <a:r>
-              <a:rPr lang="en-CA" dirty="0"/>
-              <a:t> license</a:t>
-            </a:r>
-            <a:endParaRPr lang="en-US" dirty="0"/>
-          </a:p>
-        </p:txBody>
-      </p:sp>
-      <p:sp>
-        <p:nvSpPr>
-          <p:cNvPr id="7" name="Slide Number Placeholder 6">
-            <a:extLst>
-              <a:ext uri="{FF2B5EF4-FFF2-40B4-BE49-F238E27FC236}">
-                <a16:creationId xmlns:a16="http://schemas.microsoft.com/office/drawing/2014/main" id="{03B02A91-314E-47EE-9F6F-3A18A2FFF0EC}"/>
-              </a:ext>
-            </a:extLst>
-          </p:cNvPr>
-          <p:cNvSpPr>
-            <a:spLocks noGrp="1"/>
-          </p:cNvSpPr>
-          <p:nvPr>
-            <p:ph type="sldNum" sz="quarter" idx="4294967295"/>
+            <p:ph type="body" sz="quarter" idx="17"/>
           </p:nvPr>
         </p:nvSpPr>
         <p:spPr>
           <a:xfrm>
-            <a:off x="8872538" y="4792663"/>
-            <a:ext cx="271462" cy="158750"/>
+            <a:off x="534075" y="2263771"/>
+            <a:ext cx="4383157" cy="182807"/>
           </a:xfrm>
         </p:spPr>
         <p:txBody>
           <a:bodyPr/>
-          <a:lstStyle/>
-          <a:p>
-            <a:fld id="{DD8FDF0E-2772-4D89-9F72-F3CB15D8B8AB}" type="slidenum">
-              <a:rPr lang="en-US" smtClean="0"/>
-              <a:pPr/>
-              <a:t>1</a:t>
-            </a:fld>
+          <a:lstStyle>
+            <a:defPPr>
+              <a:defRPr lang="en-US"/>
+            </a:defPPr>
+            <a:lvl1pPr marL="0" algn="l" defTabSz="685800" rtl="0" eaLnBrk="1" latinLnBrk="0" hangingPunct="1">
+              <a:defRPr sz="1350" kern="1200">
+                <a:solidFill>
+                  <a:schemeClr val="tx1"/>
+                </a:solidFill>
+                <a:latin typeface="+mn-lt"/>
+                <a:ea typeface="+mn-ea"/>
+                <a:cs typeface="+mn-cs"/>
+              </a:defRPr>
+            </a:lvl1pPr>
+            <a:lvl2pPr marL="342900" algn="l" defTabSz="685800" rtl="0" eaLnBrk="1" latinLnBrk="0" hangingPunct="1">
+              <a:defRPr sz="1350" kern="1200">
+                <a:solidFill>
+                  <a:schemeClr val="tx1"/>
+                </a:solidFill>
+                <a:latin typeface="+mn-lt"/>
+                <a:ea typeface="+mn-ea"/>
+                <a:cs typeface="+mn-cs"/>
+              </a:defRPr>
+            </a:lvl2pPr>
+            <a:lvl3pPr marL="685800" algn="l" defTabSz="685800" rtl="0" eaLnBrk="1" latinLnBrk="0" hangingPunct="1">
+              <a:defRPr sz="1350" kern="1200">
+                <a:solidFill>
+                  <a:schemeClr val="tx1"/>
+                </a:solidFill>
+                <a:latin typeface="+mn-lt"/>
+                <a:ea typeface="+mn-ea"/>
+                <a:cs typeface="+mn-cs"/>
+              </a:defRPr>
+            </a:lvl3pPr>
+            <a:lvl4pPr marL="1028700" algn="l" defTabSz="685800" rtl="0" eaLnBrk="1" latinLnBrk="0" hangingPunct="1">
+              <a:defRPr sz="1350" kern="1200">
+                <a:solidFill>
+                  <a:schemeClr val="tx1"/>
+                </a:solidFill>
+                <a:latin typeface="+mn-lt"/>
+                <a:ea typeface="+mn-ea"/>
+                <a:cs typeface="+mn-cs"/>
+              </a:defRPr>
+            </a:lvl4pPr>
+            <a:lvl5pPr marL="1371600" algn="l" defTabSz="685800" rtl="0" eaLnBrk="1" latinLnBrk="0" hangingPunct="1">
+              <a:defRPr sz="1350" kern="1200">
+                <a:solidFill>
+                  <a:schemeClr val="tx1"/>
+                </a:solidFill>
+                <a:latin typeface="+mn-lt"/>
+                <a:ea typeface="+mn-ea"/>
+                <a:cs typeface="+mn-cs"/>
+              </a:defRPr>
+            </a:lvl5pPr>
+            <a:lvl6pPr marL="1714500" algn="l" defTabSz="685800" rtl="0" eaLnBrk="1" latinLnBrk="0" hangingPunct="1">
+              <a:defRPr sz="1350" kern="1200">
+                <a:solidFill>
+                  <a:schemeClr val="tx1"/>
+                </a:solidFill>
+                <a:latin typeface="+mn-lt"/>
+                <a:ea typeface="+mn-ea"/>
+                <a:cs typeface="+mn-cs"/>
+              </a:defRPr>
+            </a:lvl6pPr>
+            <a:lvl7pPr marL="2057400" algn="l" defTabSz="685800" rtl="0" eaLnBrk="1" latinLnBrk="0" hangingPunct="1">
+              <a:defRPr sz="1350" kern="1200">
+                <a:solidFill>
+                  <a:schemeClr val="tx1"/>
+                </a:solidFill>
+                <a:latin typeface="+mn-lt"/>
+                <a:ea typeface="+mn-ea"/>
+                <a:cs typeface="+mn-cs"/>
+              </a:defRPr>
+            </a:lvl7pPr>
+            <a:lvl8pPr marL="2400300" algn="l" defTabSz="685800" rtl="0" eaLnBrk="1" latinLnBrk="0" hangingPunct="1">
+              <a:defRPr sz="1350" kern="1200">
+                <a:solidFill>
+                  <a:schemeClr val="tx1"/>
+                </a:solidFill>
+                <a:latin typeface="+mn-lt"/>
+                <a:ea typeface="+mn-ea"/>
+                <a:cs typeface="+mn-cs"/>
+              </a:defRPr>
+            </a:lvl8pPr>
+            <a:lvl9pPr marL="2743200" algn="l" defTabSz="685800" rtl="0" eaLnBrk="1" latinLnBrk="0" hangingPunct="1">
+              <a:defRPr sz="1350" kern="1200">
+                <a:solidFill>
+                  <a:schemeClr val="tx1"/>
+                </a:solidFill>
+                <a:latin typeface="+mn-lt"/>
+                <a:ea typeface="+mn-ea"/>
+                <a:cs typeface="+mn-cs"/>
+              </a:defRPr>
+            </a:lvl9pPr>
+          </a:lstStyle>
+          <a:p>
+            <a:r>
+              <a:rPr lang="en-US" dirty="0">
+                <a:cs typeface="Arial"/>
+              </a:rPr>
+              <a:t>Structured Data Capture (SDC)</a:t>
+            </a:r>
             <a:endParaRPr lang="en-US" dirty="0"/>
           </a:p>
         </p:txBody>
       </p:sp>
+      <p:pic>
+        <p:nvPicPr>
+          <p:cNvPr id="3" name="Picture 2">
+            <a:extLst>
+              <a:ext uri="{FF2B5EF4-FFF2-40B4-BE49-F238E27FC236}">
+                <a16:creationId xmlns:a16="http://schemas.microsoft.com/office/drawing/2014/main" id="{D757EB45-C247-3B54-4921-3BF1D56F9D38}"/>
+              </a:ext>
+            </a:extLst>
+          </p:cNvPr>
+          <p:cNvPicPr>
+            <a:picLocks noChangeAspect="1"/>
+          </p:cNvPicPr>
+          <p:nvPr/>
+        </p:nvPicPr>
+        <p:blipFill>
+          <a:blip r:embed="rId3"/>
+          <a:stretch>
+            <a:fillRect/>
+          </a:stretch>
+        </p:blipFill>
+        <p:spPr>
+          <a:xfrm>
+            <a:off x="3375580" y="4601608"/>
+            <a:ext cx="1304925" cy="457200"/>
+          </a:xfrm>
+          <a:prstGeom prst="rect">
+            <a:avLst/>
+          </a:prstGeom>
+        </p:spPr>
+      </p:pic>
     </p:spTree>
     <p:extLst>
       <p:ext uri="{BB962C8B-B14F-4D97-AF65-F5344CB8AC3E}">
-        <p14:creationId xmlns:p14="http://schemas.microsoft.com/office/powerpoint/2010/main" val="1226924551"/>
+        <p14:creationId xmlns:p14="http://schemas.microsoft.com/office/powerpoint/2010/main" val="2030768388"/>
       </p:ext>
     </p:extLst>
   </p:cSld>
@@ -10671,7 +11824,7 @@
           <a:p>
             <a:r>
               <a:rPr lang="en-CA" b="1"/>
-              <a:t>© 2024 Health Level Seven ® International. All Rights Reserved. Published under the Creative Commons 3.0 Attribution Unported license</a:t>
+              <a:t>© 2025 Health Level Seven ® International. All Rights Reserved. Published under the Creative Commons 3.0 Attribution Unported license</a:t>
             </a:r>
             <a:endParaRPr lang="en-US" b="1" dirty="0"/>
           </a:p>
@@ -10857,7 +12010,7 @@
           <a:p>
             <a:r>
               <a:rPr lang="en-CA" b="1"/>
-              <a:t>© 2024 Health Level Seven ® International. All Rights Reserved. Published under the Creative Commons 3.0 Attribution Unported license</a:t>
+              <a:t>© 2025 Health Level Seven ® International. All Rights Reserved. Published under the Creative Commons 3.0 Attribution Unported license</a:t>
             </a:r>
             <a:endParaRPr lang="en-US" b="1" dirty="0"/>
           </a:p>
@@ -11105,7 +12258,7 @@
           <a:p>
             <a:r>
               <a:rPr lang="en-CA" b="1"/>
-              <a:t>© 2024 Health Level Seven ® International. All Rights Reserved. Published under the Creative Commons 3.0 Attribution Unported license</a:t>
+              <a:t>© 2025 Health Level Seven ® International. All Rights Reserved. Published under the Creative Commons 3.0 Attribution Unported license</a:t>
             </a:r>
             <a:endParaRPr lang="en-US" b="1" dirty="0"/>
           </a:p>
@@ -11291,7 +12444,7 @@
           <a:p>
             <a:r>
               <a:rPr lang="en-CA" b="1"/>
-              <a:t>© 2024 Health Level Seven ® International. All Rights Reserved. Published under the Creative Commons 3.0 Attribution Unported license</a:t>
+              <a:t>© 2025 Health Level Seven ® International. All Rights Reserved. Published under the Creative Commons 3.0 Attribution Unported license</a:t>
             </a:r>
             <a:endParaRPr lang="en-US" b="1" dirty="0"/>
           </a:p>
@@ -11493,6 +12646,32 @@
             </a:r>
           </a:p>
           <a:p>
+            <a:pPr marL="1314450" lvl="3" indent="0">
+              <a:buNone/>
+            </a:pPr>
+            <a:r>
+              <a:rPr lang="en-US" sz="1800" i="1" dirty="0" err="1"/>
+              <a:t>optionExpression</a:t>
+            </a:r>
+            <a:r>
+              <a:rPr lang="en-US" sz="1800" i="1" dirty="0"/>
+              <a:t>(with x-</a:t>
+            </a:r>
+            <a:r>
+              <a:rPr lang="en-US" sz="1800" i="1" dirty="0" err="1"/>
+              <a:t>fhir</a:t>
+            </a:r>
+            <a:r>
+              <a:rPr lang="en-US" sz="1800" i="1" dirty="0"/>
+              <a:t>-query, though </a:t>
+            </a:r>
+            <a:r>
+              <a:rPr lang="en-US" sz="1800" i="1"/>
+              <a:t>need custom search)</a:t>
+            </a:r>
+            <a:endParaRPr lang="en-US" sz="1800" i="1" dirty="0"/>
+          </a:p>
+          <a:p>
             <a:pPr marL="914400" lvl="1" indent="-457200">
               <a:buFont typeface="+mj-lt"/>
               <a:buAutoNum type="arabicPeriod"/>
@@ -11527,7 +12706,7 @@
           <a:p>
             <a:r>
               <a:rPr lang="en-CA" b="1"/>
-              <a:t>© 2024 Health Level Seven ® International. All Rights Reserved. Published under the Creative Commons 3.0 Attribution Unported license</a:t>
+              <a:t>© 2025 Health Level Seven ® International. All Rights Reserved. Published under the Creative Commons 3.0 Attribution Unported license</a:t>
             </a:r>
             <a:endParaRPr lang="en-US" b="1" dirty="0"/>
           </a:p>
@@ -12003,7 +13182,7 @@
           <a:p>
             <a:r>
               <a:rPr lang="en-CA" dirty="0"/>
-              <a:t>© 2024 Health Level Seven ® International. All Rights Reserved. Published under the Creative Commons 3.0 Attribution </a:t>
+              <a:t>© 2025 Health Level Seven ® International. All Rights Reserved. Published under the Creative Commons 3.0 Attribution </a:t>
             </a:r>
             <a:r>
               <a:rPr lang="en-CA" dirty="0" err="1"/>
@@ -12221,7 +13400,7 @@
           <a:p>
             <a:r>
               <a:rPr lang="en-CA" dirty="0"/>
-              <a:t>© 2024 Health Level Seven ® International. All Rights Reserved. Published under the Creative Commons 3.0 Attribution </a:t>
+              <a:t>© 2025 Health Level Seven ® International. All Rights Reserved. Published under the Creative Commons 3.0 Attribution </a:t>
             </a:r>
             <a:r>
               <a:rPr lang="en-CA" dirty="0" err="1"/>
@@ -12424,7 +13603,7 @@
           <a:p>
             <a:r>
               <a:rPr lang="en-CA" dirty="0"/>
-              <a:t>© 2024 Health Level Seven ® International. All Rights Reserved. Published under the Creative Commons 3.0 Attribution </a:t>
+              <a:t>© 2025 Health Level Seven ® International. All Rights Reserved. Published under the Creative Commons 3.0 Attribution </a:t>
             </a:r>
             <a:r>
               <a:rPr lang="en-CA" dirty="0" err="1"/>
@@ -12631,16 +13810,11 @@
           </a:p>
           <a:p>
             <a:r>
-              <a:rPr lang="en-US" sz="1800" dirty="0"/>
+              <a:rPr lang="en-US" sz="1800">
+                <a:ea typeface="ヒラギノ角ゴ Pro W3"/>
+              </a:rPr>
               <a:t>SDC Modular &amp; Derived Forms</a:t>
             </a:r>
-          </a:p>
-          <a:p>
-            <a:r>
-              <a:rPr lang="en-US" sz="1800" dirty="0"/>
-              <a:t>SDC Open Forum</a:t>
-            </a:r>
-            <a:endParaRPr lang="en-CA" sz="1800" dirty="0"/>
           </a:p>
         </p:txBody>
       </p:sp>
@@ -12667,7 +13841,7 @@
           <a:p>
             <a:r>
               <a:rPr lang="en-CA" b="1"/>
-              <a:t>© 2024 Health Level Seven ® International. All Rights Reserved. Published under the Creative Commons 3.0 Attribution Unported license</a:t>
+              <a:t>© 2025 Health Level Seven ® International. All Rights Reserved. Published under the Creative Commons 3.0 Attribution Unported license</a:t>
             </a:r>
             <a:endParaRPr lang="en-US" b="1" dirty="0"/>
           </a:p>
@@ -12957,7 +14131,7 @@
           <a:p>
             <a:r>
               <a:rPr lang="en-CA" b="1"/>
-              <a:t>© 2024 Health Level Seven ® International. All Rights Reserved. Published under the Creative Commons 3.0 Attribution Unported license</a:t>
+              <a:t>© 2025 Health Level Seven ® International. All Rights Reserved. Published under the Creative Commons 3.0 Attribution Unported license</a:t>
             </a:r>
             <a:endParaRPr lang="en-US" b="1" dirty="0"/>
           </a:p>
@@ -13164,7 +14338,7 @@
           <a:p>
             <a:r>
               <a:rPr lang="en-CA" b="1"/>
-              <a:t>© 2024 Health Level Seven ® International. All Rights Reserved. Published under the Creative Commons 3.0 Attribution Unported license</a:t>
+              <a:t>© 2025 Health Level Seven ® International. All Rights Reserved. Published under the Creative Commons 3.0 Attribution Unported license</a:t>
             </a:r>
             <a:endParaRPr lang="en-US" b="1" dirty="0"/>
           </a:p>
@@ -13326,7 +14500,7 @@
           <a:p>
             <a:r>
               <a:rPr lang="en-CA" b="1"/>
-              <a:t>© 2024 Health Level Seven ® International. All Rights Reserved. Published under the Creative Commons 3.0 Attribution Unported license</a:t>
+              <a:t>© 2025 Health Level Seven ® International. All Rights Reserved. Published under the Creative Commons 3.0 Attribution Unported license</a:t>
             </a:r>
             <a:endParaRPr lang="en-US" b="1" dirty="0"/>
           </a:p>
@@ -14331,4 +15505,205 @@
   </a:objectDefaults>
   <a:extraClrSchemeLst/>
 </a:theme>
+</file>
+
+<file path=customXml/item1.xml><?xml version="1.0" encoding="utf-8"?>
+<p:properties xmlns:p="http://schemas.microsoft.com/office/2006/metadata/properties" xmlns:xsi="http://www.w3.org/2001/XMLSchema-instance" xmlns:pc="http://schemas.microsoft.com/office/infopath/2007/PartnerControls">
+  <documentManagement/>
+</p:properties>
+</file>
+
+<file path=customXml/item2.xml><?xml version="1.0" encoding="utf-8"?>
+<ct:contentTypeSchema xmlns:ct="http://schemas.microsoft.com/office/2006/metadata/contentType" xmlns:ma="http://schemas.microsoft.com/office/2006/metadata/properties/metaAttributes" ct:_="" ma:_="" ma:contentTypeName="Document" ma:contentTypeID="0x01010046B6A228CEBB844FBC6B8633F16E3300" ma:contentTypeVersion="4" ma:contentTypeDescription="Create a new document." ma:contentTypeScope="" ma:versionID="5b56d2be9ea1ecaf21ca08678214dcd0">
+  <xsd:schema xmlns:xsd="http://www.w3.org/2001/XMLSchema" xmlns:xs="http://www.w3.org/2001/XMLSchema" xmlns:p="http://schemas.microsoft.com/office/2006/metadata/properties" xmlns:ns2="2371556d-c2f8-4c27-a7c5-4c2acf225d27" targetNamespace="http://schemas.microsoft.com/office/2006/metadata/properties" ma:root="true" ma:fieldsID="e32f1ed78c00c18b31e32be9b8f4ba9c" ns2:_="">
+    <xsd:import namespace="2371556d-c2f8-4c27-a7c5-4c2acf225d27"/>
+    <xsd:element name="properties">
+      <xsd:complexType>
+        <xsd:sequence>
+          <xsd:element name="documentManagement">
+            <xsd:complexType>
+              <xsd:all>
+                <xsd:element ref="ns2:MediaServiceMetadata" minOccurs="0"/>
+                <xsd:element ref="ns2:MediaServiceFastMetadata" minOccurs="0"/>
+                <xsd:element ref="ns2:MediaServiceSearchProperties" minOccurs="0"/>
+                <xsd:element ref="ns2:MediaServiceObjectDetectorVersions" minOccurs="0"/>
+              </xsd:all>
+            </xsd:complexType>
+          </xsd:element>
+        </xsd:sequence>
+      </xsd:complexType>
+    </xsd:element>
+  </xsd:schema>
+  <xsd:schema xmlns:xsd="http://www.w3.org/2001/XMLSchema" xmlns:xs="http://www.w3.org/2001/XMLSchema" xmlns:dms="http://schemas.microsoft.com/office/2006/documentManagement/types" xmlns:pc="http://schemas.microsoft.com/office/infopath/2007/PartnerControls" targetNamespace="2371556d-c2f8-4c27-a7c5-4c2acf225d27" elementFormDefault="qualified">
+    <xsd:import namespace="http://schemas.microsoft.com/office/2006/documentManagement/types"/>
+    <xsd:import namespace="http://schemas.microsoft.com/office/infopath/2007/PartnerControls"/>
+    <xsd:element name="MediaServiceMetadata" ma:index="8" nillable="true" ma:displayName="MediaServiceMetadata" ma:hidden="true" ma:internalName="MediaServiceMetadata" ma:readOnly="true">
+      <xsd:simpleType>
+        <xsd:restriction base="dms:Note"/>
+      </xsd:simpleType>
+    </xsd:element>
+    <xsd:element name="MediaServiceFastMetadata" ma:index="9" nillable="true" ma:displayName="MediaServiceFastMetadata" ma:hidden="true" ma:internalName="MediaServiceFastMetadata" ma:readOnly="true">
+      <xsd:simpleType>
+        <xsd:restriction base="dms:Note"/>
+      </xsd:simpleType>
+    </xsd:element>
+    <xsd:element name="MediaServiceSearchProperties" ma:index="10" nillable="true" ma:displayName="MediaServiceSearchProperties" ma:hidden="true" ma:internalName="MediaServiceSearchProperties" ma:readOnly="true">
+      <xsd:simpleType>
+        <xsd:restriction base="dms:Note"/>
+      </xsd:simpleType>
+    </xsd:element>
+    <xsd:element name="MediaServiceObjectDetectorVersions" ma:index="11" nillable="true" ma:displayName="MediaServiceObjectDetectorVersions" ma:hidden="true" ma:indexed="true" ma:internalName="MediaServiceObjectDetectorVersions" ma:readOnly="true">
+      <xsd:simpleType>
+        <xsd:restriction base="dms:Text"/>
+      </xsd:simpleType>
+    </xsd:element>
+  </xsd:schema>
+  <xsd:schema xmlns="http://schemas.openxmlformats.org/package/2006/metadata/core-properties" xmlns:xsd="http://www.w3.org/2001/XMLSchema" xmlns:xsi="http://www.w3.org/2001/XMLSchema-instance" xmlns:dc="http://purl.org/dc/elements/1.1/" xmlns:dcterms="http://purl.org/dc/terms/" xmlns:odoc="http://schemas.microsoft.com/internal/obd" targetNamespace="http://schemas.openxmlformats.org/package/2006/metadata/core-properties" elementFormDefault="qualified" attributeFormDefault="unqualified" blockDefault="#all">
+    <xsd:import namespace="http://purl.org/dc/elements/1.1/" schemaLocation="http://dublincore.org/schemas/xmls/qdc/2003/04/02/dc.xsd"/>
+    <xsd:import namespace="http://purl.org/dc/terms/" schemaLocation="http://dublincore.org/schemas/xmls/qdc/2003/04/02/dcterms.xsd"/>
+    <xsd:element name="coreProperties" type="CT_coreProperties"/>
+    <xsd:complexType name="CT_coreProperties">
+      <xsd:all>
+        <xsd:element ref="dc:creator" minOccurs="0" maxOccurs="1"/>
+        <xsd:element ref="dcterms:created" minOccurs="0" maxOccurs="1"/>
+        <xsd:element ref="dc:identifier" minOccurs="0" maxOccurs="1"/>
+        <xsd:element name="contentType" minOccurs="0" maxOccurs="1" type="xsd:string" ma:index="0" ma:displayName="Content Type"/>
+        <xsd:element ref="dc:title" minOccurs="0" maxOccurs="1" ma:index="4" ma:displayName="Title"/>
+        <xsd:element ref="dc:subject" minOccurs="0" maxOccurs="1"/>
+        <xsd:element ref="dc:description" minOccurs="0" maxOccurs="1"/>
+        <xsd:element name="keywords" minOccurs="0" maxOccurs="1" type="xsd:string"/>
+        <xsd:element ref="dc:language" minOccurs="0" maxOccurs="1"/>
+        <xsd:element name="category" minOccurs="0" maxOccurs="1" type="xsd:string"/>
+        <xsd:element name="version" minOccurs="0" maxOccurs="1" type="xsd:string"/>
+        <xsd:element name="revision" minOccurs="0" maxOccurs="1" type="xsd:string">
+          <xsd:annotation>
+            <xsd:documentation>
+                        This value indicates the number of saves or revisions. The application is responsible for updating this value after each revision.
+                    </xsd:documentation>
+          </xsd:annotation>
+        </xsd:element>
+        <xsd:element name="lastModifiedBy" minOccurs="0" maxOccurs="1" type="xsd:string"/>
+        <xsd:element ref="dcterms:modified" minOccurs="0" maxOccurs="1"/>
+        <xsd:element name="contentStatus" minOccurs="0" maxOccurs="1" type="xsd:string"/>
+      </xsd:all>
+    </xsd:complexType>
+  </xsd:schema>
+  <xs:schema xmlns:pc="http://schemas.microsoft.com/office/infopath/2007/PartnerControls" xmlns:xs="http://www.w3.org/2001/XMLSchema" targetNamespace="http://schemas.microsoft.com/office/infopath/2007/PartnerControls" elementFormDefault="qualified" attributeFormDefault="unqualified">
+    <xs:element name="Person">
+      <xs:complexType>
+        <xs:sequence>
+          <xs:element ref="pc:DisplayName" minOccurs="0"/>
+          <xs:element ref="pc:AccountId" minOccurs="0"/>
+          <xs:element ref="pc:AccountType" minOccurs="0"/>
+        </xs:sequence>
+      </xs:complexType>
+    </xs:element>
+    <xs:element name="DisplayName" type="xs:string"/>
+    <xs:element name="AccountId" type="xs:string"/>
+    <xs:element name="AccountType" type="xs:string"/>
+    <xs:element name="BDCAssociatedEntity">
+      <xs:complexType>
+        <xs:sequence>
+          <xs:element ref="pc:BDCEntity" minOccurs="0" maxOccurs="unbounded"/>
+        </xs:sequence>
+        <xs:attribute ref="pc:EntityNamespace"/>
+        <xs:attribute ref="pc:EntityName"/>
+        <xs:attribute ref="pc:SystemInstanceName"/>
+        <xs:attribute ref="pc:AssociationName"/>
+      </xs:complexType>
+    </xs:element>
+    <xs:attribute name="EntityNamespace" type="xs:string"/>
+    <xs:attribute name="EntityName" type="xs:string"/>
+    <xs:attribute name="SystemInstanceName" type="xs:string"/>
+    <xs:attribute name="AssociationName" type="xs:string"/>
+    <xs:element name="BDCEntity">
+      <xs:complexType>
+        <xs:sequence>
+          <xs:element ref="pc:EntityDisplayName" minOccurs="0"/>
+          <xs:element ref="pc:EntityInstanceReference" minOccurs="0"/>
+          <xs:element ref="pc:EntityId1" minOccurs="0"/>
+          <xs:element ref="pc:EntityId2" minOccurs="0"/>
+          <xs:element ref="pc:EntityId3" minOccurs="0"/>
+          <xs:element ref="pc:EntityId4" minOccurs="0"/>
+          <xs:element ref="pc:EntityId5" minOccurs="0"/>
+        </xs:sequence>
+      </xs:complexType>
+    </xs:element>
+    <xs:element name="EntityDisplayName" type="xs:string"/>
+    <xs:element name="EntityInstanceReference" type="xs:string"/>
+    <xs:element name="EntityId1" type="xs:string"/>
+    <xs:element name="EntityId2" type="xs:string"/>
+    <xs:element name="EntityId3" type="xs:string"/>
+    <xs:element name="EntityId4" type="xs:string"/>
+    <xs:element name="EntityId5" type="xs:string"/>
+    <xs:element name="Terms">
+      <xs:complexType>
+        <xs:sequence>
+          <xs:element ref="pc:TermInfo" minOccurs="0" maxOccurs="unbounded"/>
+        </xs:sequence>
+      </xs:complexType>
+    </xs:element>
+    <xs:element name="TermInfo">
+      <xs:complexType>
+        <xs:sequence>
+          <xs:element ref="pc:TermName" minOccurs="0"/>
+          <xs:element ref="pc:TermId" minOccurs="0"/>
+        </xs:sequence>
+      </xs:complexType>
+    </xs:element>
+    <xs:element name="TermName" type="xs:string"/>
+    <xs:element name="TermId" type="xs:string"/>
+  </xs:schema>
+</ct:contentTypeSchema>
+</file>
+
+<file path=customXml/item3.xml><?xml version="1.0" encoding="utf-8"?>
+<?mso-contentType ?>
+<FormTemplates xmlns="http://schemas.microsoft.com/sharepoint/v3/contenttype/forms">
+  <Display>DocumentLibraryForm</Display>
+  <Edit>DocumentLibraryForm</Edit>
+  <New>DocumentLibraryForm</New>
+</FormTemplates>
+</file>
+
+<file path=customXml/itemProps1.xml><?xml version="1.0" encoding="utf-8"?>
+<ds:datastoreItem xmlns:ds="http://schemas.openxmlformats.org/officeDocument/2006/customXml" ds:itemID="{FE61C1C2-E226-4504-8AEC-FA8BD7CCD1CA}">
+  <ds:schemaRefs>
+    <ds:schemaRef ds:uri="2371556d-c2f8-4c27-a7c5-4c2acf225d27"/>
+    <ds:schemaRef ds:uri="http://schemas.microsoft.com/office/2006/documentManagement/types"/>
+    <ds:schemaRef ds:uri="http://schemas.microsoft.com/office/2006/metadata/properties"/>
+    <ds:schemaRef ds:uri="http://purl.org/dc/elements/1.1/"/>
+    <ds:schemaRef ds:uri="http://www.w3.org/XML/1998/namespace"/>
+    <ds:schemaRef ds:uri="http://schemas.openxmlformats.org/package/2006/metadata/core-properties"/>
+    <ds:schemaRef ds:uri="http://purl.org/dc/dcmitype/"/>
+    <ds:schemaRef ds:uri="http://schemas.microsoft.com/office/infopath/2007/PartnerControls"/>
+    <ds:schemaRef ds:uri="http://purl.org/dc/terms/"/>
+  </ds:schemaRefs>
+</ds:datastoreItem>
+</file>
+
+<file path=customXml/itemProps2.xml><?xml version="1.0" encoding="utf-8"?>
+<ds:datastoreItem xmlns:ds="http://schemas.openxmlformats.org/officeDocument/2006/customXml" ds:itemID="{377F5B7C-7F2B-4FC3-82DB-361369866C1E}">
+  <ds:schemaRefs>
+    <ds:schemaRef ds:uri="http://schemas.microsoft.com/office/2006/metadata/contentType"/>
+    <ds:schemaRef ds:uri="http://schemas.microsoft.com/office/2006/metadata/properties/metaAttributes"/>
+    <ds:schemaRef ds:uri="http://www.w3.org/2001/XMLSchema"/>
+    <ds:schemaRef ds:uri="http://schemas.microsoft.com/office/2006/metadata/properties"/>
+    <ds:schemaRef ds:uri="2371556d-c2f8-4c27-a7c5-4c2acf225d27"/>
+    <ds:schemaRef ds:uri="http://schemas.microsoft.com/office/2006/documentManagement/types"/>
+    <ds:schemaRef ds:uri="http://schemas.microsoft.com/office/infopath/2007/PartnerControls"/>
+    <ds:schemaRef ds:uri="http://schemas.openxmlformats.org/package/2006/metadata/core-properties"/>
+    <ds:schemaRef ds:uri="http://purl.org/dc/elements/1.1/"/>
+    <ds:schemaRef ds:uri="http://purl.org/dc/terms/"/>
+    <ds:schemaRef ds:uri="http://schemas.microsoft.com/internal/obd"/>
+  </ds:schemaRefs>
+</ds:datastoreItem>
+</file>
+
+<file path=customXml/itemProps3.xml><?xml version="1.0" encoding="utf-8"?>
+<ds:datastoreItem xmlns:ds="http://schemas.openxmlformats.org/officeDocument/2006/customXml" ds:itemID="{5C29CC91-84EA-4FF3-9875-EEB6B667304C}">
+  <ds:schemaRefs>
+    <ds:schemaRef ds:uri="http://schemas.microsoft.com/sharepoint/v3/contenttype/forms"/>
+  </ds:schemaRefs>
+</ds:datastoreItem>
 </file>
</xml_diff>